<commit_message>
Added first draft of tree based representation and draw.io visualization
</commit_message>
<xml_diff>
--- a/doc/ConnectFourPresentationDraft.pptx
+++ b/doc/ConnectFourPresentationDraft.pptx
@@ -116,6 +116,11 @@
       </a:defRPr>
     </a:lvl9pPr>
   </p:defaultTextStyle>
+  <p:extLst>
+    <p:ext uri="{EFAFB233-063F-42B5-8137-9DF3F51BA10A}">
+      <p15:sldGuideLst xmlns:p15="http://schemas.microsoft.com/office/powerpoint/2012/main"/>
+    </p:ext>
+  </p:extLst>
 </p:presentation>
 </file>
 
@@ -268,7 +273,7 @@
           <a:p>
             <a:fld id="{586C9993-CC30-4DF1-A988-C4E2EFC1E3B3}" type="datetimeFigureOut">
               <a:rPr lang="de-AT" smtClean="0"/>
-              <a:t>10.05.2024</a:t>
+              <a:t>12.05.2024</a:t>
             </a:fld>
             <a:endParaRPr lang="de-AT"/>
           </a:p>
@@ -468,7 +473,7 @@
           <a:p>
             <a:fld id="{586C9993-CC30-4DF1-A988-C4E2EFC1E3B3}" type="datetimeFigureOut">
               <a:rPr lang="de-AT" smtClean="0"/>
-              <a:t>10.05.2024</a:t>
+              <a:t>12.05.2024</a:t>
             </a:fld>
             <a:endParaRPr lang="de-AT"/>
           </a:p>
@@ -678,7 +683,7 @@
           <a:p>
             <a:fld id="{586C9993-CC30-4DF1-A988-C4E2EFC1E3B3}" type="datetimeFigureOut">
               <a:rPr lang="de-AT" smtClean="0"/>
-              <a:t>10.05.2024</a:t>
+              <a:t>12.05.2024</a:t>
             </a:fld>
             <a:endParaRPr lang="de-AT"/>
           </a:p>
@@ -878,7 +883,7 @@
           <a:p>
             <a:fld id="{586C9993-CC30-4DF1-A988-C4E2EFC1E3B3}" type="datetimeFigureOut">
               <a:rPr lang="de-AT" smtClean="0"/>
-              <a:t>10.05.2024</a:t>
+              <a:t>12.05.2024</a:t>
             </a:fld>
             <a:endParaRPr lang="de-AT"/>
           </a:p>
@@ -1154,7 +1159,7 @@
           <a:p>
             <a:fld id="{586C9993-CC30-4DF1-A988-C4E2EFC1E3B3}" type="datetimeFigureOut">
               <a:rPr lang="de-AT" smtClean="0"/>
-              <a:t>10.05.2024</a:t>
+              <a:t>12.05.2024</a:t>
             </a:fld>
             <a:endParaRPr lang="de-AT"/>
           </a:p>
@@ -1422,7 +1427,7 @@
           <a:p>
             <a:fld id="{586C9993-CC30-4DF1-A988-C4E2EFC1E3B3}" type="datetimeFigureOut">
               <a:rPr lang="de-AT" smtClean="0"/>
-              <a:t>10.05.2024</a:t>
+              <a:t>12.05.2024</a:t>
             </a:fld>
             <a:endParaRPr lang="de-AT"/>
           </a:p>
@@ -1837,7 +1842,7 @@
           <a:p>
             <a:fld id="{586C9993-CC30-4DF1-A988-C4E2EFC1E3B3}" type="datetimeFigureOut">
               <a:rPr lang="de-AT" smtClean="0"/>
-              <a:t>10.05.2024</a:t>
+              <a:t>12.05.2024</a:t>
             </a:fld>
             <a:endParaRPr lang="de-AT"/>
           </a:p>
@@ -1979,7 +1984,7 @@
           <a:p>
             <a:fld id="{586C9993-CC30-4DF1-A988-C4E2EFC1E3B3}" type="datetimeFigureOut">
               <a:rPr lang="de-AT" smtClean="0"/>
-              <a:t>10.05.2024</a:t>
+              <a:t>12.05.2024</a:t>
             </a:fld>
             <a:endParaRPr lang="de-AT"/>
           </a:p>
@@ -2092,7 +2097,7 @@
           <a:p>
             <a:fld id="{586C9993-CC30-4DF1-A988-C4E2EFC1E3B3}" type="datetimeFigureOut">
               <a:rPr lang="de-AT" smtClean="0"/>
-              <a:t>10.05.2024</a:t>
+              <a:t>12.05.2024</a:t>
             </a:fld>
             <a:endParaRPr lang="de-AT"/>
           </a:p>
@@ -2405,7 +2410,7 @@
           <a:p>
             <a:fld id="{586C9993-CC30-4DF1-A988-C4E2EFC1E3B3}" type="datetimeFigureOut">
               <a:rPr lang="de-AT" smtClean="0"/>
-              <a:t>10.05.2024</a:t>
+              <a:t>12.05.2024</a:t>
             </a:fld>
             <a:endParaRPr lang="de-AT"/>
           </a:p>
@@ -2694,7 +2699,7 @@
           <a:p>
             <a:fld id="{586C9993-CC30-4DF1-A988-C4E2EFC1E3B3}" type="datetimeFigureOut">
               <a:rPr lang="de-AT" smtClean="0"/>
-              <a:t>10.05.2024</a:t>
+              <a:t>12.05.2024</a:t>
             </a:fld>
             <a:endParaRPr lang="de-AT"/>
           </a:p>
@@ -2937,7 +2942,7 @@
           <a:p>
             <a:fld id="{586C9993-CC30-4DF1-A988-C4E2EFC1E3B3}" type="datetimeFigureOut">
               <a:rPr lang="de-AT" smtClean="0"/>
-              <a:t>10.05.2024</a:t>
+              <a:t>12.05.2024</a:t>
             </a:fld>
             <a:endParaRPr lang="de-AT"/>
           </a:p>
@@ -4301,7 +4306,7 @@
               <a:buNone/>
             </a:pPr>
             <a:r>
-              <a:rPr lang="en-US" sz="2600" b="0" dirty="0">
+              <a:rPr lang="en-US" sz="2300" b="0" dirty="0">
                 <a:solidFill>
                   <a:srgbClr val="6A9955"/>
                 </a:solidFill>
@@ -4310,7 +4315,7 @@
               </a:rPr>
               <a:t>// FH: vector of the capacity of win conditions</a:t>
             </a:r>
-            <a:endParaRPr lang="en-US" sz="2600" b="0" dirty="0">
+            <a:endParaRPr lang="en-US" sz="2300" b="0" dirty="0">
               <a:solidFill>
                 <a:srgbClr val="CCCCCC"/>
               </a:solidFill>
@@ -4323,7 +4328,7 @@
               <a:buNone/>
             </a:pPr>
             <a:r>
-              <a:rPr lang="en-US" sz="2600" b="0" dirty="0">
+              <a:rPr lang="en-US" sz="2300" b="0" dirty="0">
                 <a:solidFill>
                   <a:srgbClr val="6A9955"/>
                 </a:solidFill>
@@ -4338,7 +4343,7 @@
               <a:buNone/>
             </a:pPr>
             <a:r>
-              <a:rPr lang="en-US" sz="2600" b="0" dirty="0">
+              <a:rPr lang="en-US" sz="2300" b="0" dirty="0">
                 <a:solidFill>
                   <a:srgbClr val="4EC9B0"/>
                 </a:solidFill>
@@ -4348,7 +4353,7 @@
               <a:t>int</a:t>
             </a:r>
             <a:r>
-              <a:rPr lang="en-US" sz="2600" b="0" dirty="0">
+              <a:rPr lang="en-US" sz="2300" b="0" dirty="0">
                 <a:solidFill>
                   <a:srgbClr val="CCCCCC"/>
                 </a:solidFill>
@@ -4358,7 +4363,7 @@
               <a:t> </a:t>
             </a:r>
             <a:r>
-              <a:rPr lang="en-US" sz="2600" b="0" dirty="0" err="1">
+              <a:rPr lang="en-US" sz="2300" b="0" dirty="0" err="1">
                 <a:solidFill>
                   <a:srgbClr val="9CDCFE"/>
                 </a:solidFill>
@@ -4368,7 +4373,7 @@
               <a:t>horizontalWins</a:t>
             </a:r>
             <a:r>
-              <a:rPr lang="en-US" sz="2600" b="0" dirty="0">
+              <a:rPr lang="en-US" sz="2300" b="0" dirty="0">
                 <a:solidFill>
                   <a:srgbClr val="CCCCCC"/>
                 </a:solidFill>
@@ -4378,7 +4383,7 @@
               <a:t> </a:t>
             </a:r>
             <a:r>
-              <a:rPr lang="en-US" sz="2600" b="0" dirty="0">
+              <a:rPr lang="en-US" sz="2300" b="0" dirty="0">
                 <a:solidFill>
                   <a:srgbClr val="D4D4D4"/>
                 </a:solidFill>
@@ -4388,7 +4393,7 @@
               <a:t>=</a:t>
             </a:r>
             <a:r>
-              <a:rPr lang="en-US" sz="2600" b="0" dirty="0">
+              <a:rPr lang="en-US" sz="2300" b="0" dirty="0">
                 <a:solidFill>
                   <a:srgbClr val="CCCCCC"/>
                 </a:solidFill>
@@ -4398,7 +4403,7 @@
               <a:t> </a:t>
             </a:r>
             <a:r>
-              <a:rPr lang="en-US" sz="2600" b="0" dirty="0">
+              <a:rPr lang="en-US" sz="2300" b="0" dirty="0">
                 <a:solidFill>
                   <a:srgbClr val="4FC1FF"/>
                 </a:solidFill>
@@ -4408,7 +4413,7 @@
               <a:t>NUMBER_OF_ROWS</a:t>
             </a:r>
             <a:r>
-              <a:rPr lang="en-US" sz="2600" b="0" dirty="0">
+              <a:rPr lang="en-US" sz="2300" b="0" dirty="0">
                 <a:solidFill>
                   <a:srgbClr val="CCCCCC"/>
                 </a:solidFill>
@@ -4418,7 +4423,7 @@
               <a:t> </a:t>
             </a:r>
             <a:r>
-              <a:rPr lang="en-US" sz="2600" b="0" dirty="0">
+              <a:rPr lang="en-US" sz="2300" b="0" dirty="0">
                 <a:solidFill>
                   <a:srgbClr val="D4D4D4"/>
                 </a:solidFill>
@@ -4428,7 +4433,7 @@
               <a:t>*</a:t>
             </a:r>
             <a:r>
-              <a:rPr lang="en-US" sz="2600" b="0" dirty="0">
+              <a:rPr lang="en-US" sz="2300" b="0" dirty="0">
                 <a:solidFill>
                   <a:srgbClr val="CCCCCC"/>
                 </a:solidFill>
@@ -4438,7 +4443,7 @@
               <a:t> (</a:t>
             </a:r>
             <a:r>
-              <a:rPr lang="en-US" sz="2600" b="0" dirty="0">
+              <a:rPr lang="en-US" sz="2300" b="0" dirty="0">
                 <a:solidFill>
                   <a:srgbClr val="4FC1FF"/>
                 </a:solidFill>
@@ -4448,7 +4453,7 @@
               <a:t>NUMBER_OF_COLUMNS</a:t>
             </a:r>
             <a:r>
-              <a:rPr lang="en-US" sz="2600" b="0" dirty="0">
+              <a:rPr lang="en-US" sz="2300" b="0" dirty="0">
                 <a:solidFill>
                   <a:srgbClr val="CCCCCC"/>
                 </a:solidFill>
@@ -4458,7 +4463,7 @@
               <a:t> </a:t>
             </a:r>
             <a:r>
-              <a:rPr lang="en-US" sz="2600" b="0" dirty="0">
+              <a:rPr lang="en-US" sz="2300" b="0" dirty="0">
                 <a:solidFill>
                   <a:srgbClr val="D4D4D4"/>
                 </a:solidFill>
@@ -4468,7 +4473,7 @@
               <a:t>-</a:t>
             </a:r>
             <a:r>
-              <a:rPr lang="en-US" sz="2600" b="0" dirty="0">
+              <a:rPr lang="en-US" sz="2300" b="0" dirty="0">
                 <a:solidFill>
                   <a:srgbClr val="CCCCCC"/>
                 </a:solidFill>
@@ -4478,7 +4483,7 @@
               <a:t> </a:t>
             </a:r>
             <a:r>
-              <a:rPr lang="en-US" sz="2600" b="0" dirty="0">
+              <a:rPr lang="en-US" sz="2300" b="0" dirty="0">
                 <a:solidFill>
                   <a:srgbClr val="B5CEA8"/>
                 </a:solidFill>
@@ -4488,7 +4493,7 @@
               <a:t>3</a:t>
             </a:r>
             <a:r>
-              <a:rPr lang="en-US" sz="2600" b="0" dirty="0">
+              <a:rPr lang="en-US" sz="2300" b="0" dirty="0">
                 <a:solidFill>
                   <a:srgbClr val="CCCCCC"/>
                 </a:solidFill>
@@ -4503,7 +4508,7 @@
               <a:buNone/>
             </a:pPr>
             <a:r>
-              <a:rPr lang="en-US" sz="2600" b="0" dirty="0">
+              <a:rPr lang="en-US" sz="2300" b="0" dirty="0">
                 <a:solidFill>
                   <a:srgbClr val="4EC9B0"/>
                 </a:solidFill>
@@ -4513,7 +4518,7 @@
               <a:t>int</a:t>
             </a:r>
             <a:r>
-              <a:rPr lang="en-US" sz="2600" b="0" dirty="0">
+              <a:rPr lang="en-US" sz="2300" b="0" dirty="0">
                 <a:solidFill>
                   <a:srgbClr val="CCCCCC"/>
                 </a:solidFill>
@@ -4523,7 +4528,7 @@
               <a:t> </a:t>
             </a:r>
             <a:r>
-              <a:rPr lang="en-US" sz="2600" b="0" dirty="0" err="1">
+              <a:rPr lang="en-US" sz="2300" b="0" dirty="0" err="1">
                 <a:solidFill>
                   <a:srgbClr val="9CDCFE"/>
                 </a:solidFill>
@@ -4533,7 +4538,7 @@
               <a:t>verticalWins</a:t>
             </a:r>
             <a:r>
-              <a:rPr lang="en-US" sz="2600" b="0" dirty="0">
+              <a:rPr lang="en-US" sz="2300" b="0" dirty="0">
                 <a:solidFill>
                   <a:srgbClr val="CCCCCC"/>
                 </a:solidFill>
@@ -4543,7 +4548,7 @@
               <a:t> </a:t>
             </a:r>
             <a:r>
-              <a:rPr lang="en-US" sz="2600" b="0" dirty="0">
+              <a:rPr lang="en-US" sz="2300" b="0" dirty="0">
                 <a:solidFill>
                   <a:srgbClr val="D4D4D4"/>
                 </a:solidFill>
@@ -4553,7 +4558,7 @@
               <a:t>=</a:t>
             </a:r>
             <a:r>
-              <a:rPr lang="en-US" sz="2600" b="0" dirty="0">
+              <a:rPr lang="en-US" sz="2300" b="0" dirty="0">
                 <a:solidFill>
                   <a:srgbClr val="CCCCCC"/>
                 </a:solidFill>
@@ -4563,7 +4568,7 @@
               <a:t> </a:t>
             </a:r>
             <a:r>
-              <a:rPr lang="en-US" sz="2600" b="0" dirty="0">
+              <a:rPr lang="en-US" sz="2300" b="0" dirty="0">
                 <a:solidFill>
                   <a:srgbClr val="4FC1FF"/>
                 </a:solidFill>
@@ -4573,7 +4578,7 @@
               <a:t>NUMBER_OF_COLUMNS</a:t>
             </a:r>
             <a:r>
-              <a:rPr lang="en-US" sz="2600" b="0" dirty="0">
+              <a:rPr lang="en-US" sz="2300" b="0" dirty="0">
                 <a:solidFill>
                   <a:srgbClr val="CCCCCC"/>
                 </a:solidFill>
@@ -4583,7 +4588,7 @@
               <a:t> </a:t>
             </a:r>
             <a:r>
-              <a:rPr lang="en-US" sz="2600" b="0" dirty="0">
+              <a:rPr lang="en-US" sz="2300" b="0" dirty="0">
                 <a:solidFill>
                   <a:srgbClr val="D4D4D4"/>
                 </a:solidFill>
@@ -4593,7 +4598,7 @@
               <a:t>*</a:t>
             </a:r>
             <a:r>
-              <a:rPr lang="en-US" sz="2600" b="0" dirty="0">
+              <a:rPr lang="en-US" sz="2300" b="0" dirty="0">
                 <a:solidFill>
                   <a:srgbClr val="CCCCCC"/>
                 </a:solidFill>
@@ -4603,7 +4608,7 @@
               <a:t> (</a:t>
             </a:r>
             <a:r>
-              <a:rPr lang="en-US" sz="2600" b="0" dirty="0">
+              <a:rPr lang="en-US" sz="2300" b="0" dirty="0">
                 <a:solidFill>
                   <a:srgbClr val="4FC1FF"/>
                 </a:solidFill>
@@ -4613,7 +4618,7 @@
               <a:t>NUMBER_OF_ROWS</a:t>
             </a:r>
             <a:r>
-              <a:rPr lang="en-US" sz="2600" b="0" dirty="0">
+              <a:rPr lang="en-US" sz="2300" b="0" dirty="0">
                 <a:solidFill>
                   <a:srgbClr val="CCCCCC"/>
                 </a:solidFill>
@@ -4623,7 +4628,7 @@
               <a:t> </a:t>
             </a:r>
             <a:r>
-              <a:rPr lang="en-US" sz="2600" b="0" dirty="0">
+              <a:rPr lang="en-US" sz="2300" b="0" dirty="0">
                 <a:solidFill>
                   <a:srgbClr val="D4D4D4"/>
                 </a:solidFill>
@@ -4633,7 +4638,7 @@
               <a:t>-</a:t>
             </a:r>
             <a:r>
-              <a:rPr lang="en-US" sz="2600" b="0" dirty="0">
+              <a:rPr lang="en-US" sz="2300" b="0" dirty="0">
                 <a:solidFill>
                   <a:srgbClr val="CCCCCC"/>
                 </a:solidFill>
@@ -4643,7 +4648,7 @@
               <a:t> </a:t>
             </a:r>
             <a:r>
-              <a:rPr lang="en-US" sz="2600" b="0" dirty="0">
+              <a:rPr lang="en-US" sz="2300" b="0" dirty="0">
                 <a:solidFill>
                   <a:srgbClr val="B5CEA8"/>
                 </a:solidFill>
@@ -4653,7 +4658,7 @@
               <a:t>3</a:t>
             </a:r>
             <a:r>
-              <a:rPr lang="en-US" sz="2600" b="0" dirty="0">
+              <a:rPr lang="en-US" sz="2300" b="0" dirty="0">
                 <a:solidFill>
                   <a:srgbClr val="CCCCCC"/>
                 </a:solidFill>
@@ -4668,16 +4673,31 @@
               <a:buNone/>
             </a:pPr>
             <a:r>
-              <a:rPr lang="en-US" sz="2600" b="0" dirty="0">
+              <a:rPr lang="en-US" sz="2300" b="0" dirty="0">
                 <a:solidFill>
                   <a:srgbClr val="6A9955"/>
                 </a:solidFill>
                 <a:effectLst/>
                 <a:latin typeface="Consolas" panose="020B0609020204030204" pitchFamily="49" charset="0"/>
               </a:rPr>
-              <a:t>// For diagonal wins we must get all possible positions from which </a:t>
-            </a:r>
-            <a:endParaRPr lang="en-US" sz="2600" b="0" dirty="0">
+              <a:t>// For diagonal wins we must get all possible positions from </a:t>
+            </a:r>
+          </a:p>
+          <a:p>
+            <a:pPr marL="0" indent="0">
+              <a:buNone/>
+            </a:pPr>
+            <a:r>
+              <a:rPr lang="en-US" sz="2300" b="0" dirty="0">
+                <a:solidFill>
+                  <a:srgbClr val="6A9955"/>
+                </a:solidFill>
+                <a:effectLst/>
+                <a:latin typeface="Consolas" panose="020B0609020204030204" pitchFamily="49" charset="0"/>
+              </a:rPr>
+              <a:t>which </a:t>
+            </a:r>
+            <a:endParaRPr lang="en-US" sz="2300" b="0" dirty="0">
               <a:solidFill>
                 <a:srgbClr val="CCCCCC"/>
               </a:solidFill>
@@ -4690,7 +4710,7 @@
               <a:buNone/>
             </a:pPr>
             <a:r>
-              <a:rPr lang="en-US" sz="2600" b="0" dirty="0">
+              <a:rPr lang="en-US" sz="2300" b="0" dirty="0">
                 <a:solidFill>
                   <a:srgbClr val="6A9955"/>
                 </a:solidFill>
@@ -4699,7 +4719,7 @@
               </a:rPr>
               <a:t>// we can achieve a diagonal line and multiply it by 2 since we can</a:t>
             </a:r>
-            <a:endParaRPr lang="en-US" sz="2600" b="0" dirty="0">
+            <a:endParaRPr lang="en-US" sz="2300" b="0" dirty="0">
               <a:solidFill>
                 <a:srgbClr val="CCCCCC"/>
               </a:solidFill>
@@ -4712,7 +4732,7 @@
               <a:buNone/>
             </a:pPr>
             <a:r>
-              <a:rPr lang="en-US" sz="2600" b="0" dirty="0">
+              <a:rPr lang="en-US" sz="2300" b="0" dirty="0">
                 <a:solidFill>
                   <a:srgbClr val="6A9955"/>
                 </a:solidFill>
@@ -4721,7 +4741,7 @@
               </a:rPr>
               <a:t>// either get it right/left diagonal</a:t>
             </a:r>
-            <a:endParaRPr lang="en-US" sz="2600" b="0" dirty="0">
+            <a:endParaRPr lang="en-US" sz="2300" b="0" dirty="0">
               <a:solidFill>
                 <a:srgbClr val="CCCCCC"/>
               </a:solidFill>
@@ -4734,7 +4754,7 @@
               <a:buNone/>
             </a:pPr>
             <a:r>
-              <a:rPr lang="en-US" sz="2600" b="0" dirty="0">
+              <a:rPr lang="en-US" sz="2300" b="0" dirty="0">
                 <a:solidFill>
                   <a:srgbClr val="4EC9B0"/>
                 </a:solidFill>
@@ -4744,7 +4764,7 @@
               <a:t>int</a:t>
             </a:r>
             <a:r>
-              <a:rPr lang="en-US" sz="2600" b="0" dirty="0">
+              <a:rPr lang="en-US" sz="2300" b="0" dirty="0">
                 <a:solidFill>
                   <a:srgbClr val="CCCCCC"/>
                 </a:solidFill>
@@ -4754,7 +4774,7 @@
               <a:t> </a:t>
             </a:r>
             <a:r>
-              <a:rPr lang="en-US" sz="2600" b="0" dirty="0" err="1">
+              <a:rPr lang="en-US" sz="2300" b="0" dirty="0" err="1">
                 <a:solidFill>
                   <a:srgbClr val="9CDCFE"/>
                 </a:solidFill>
@@ -4764,7 +4784,7 @@
               <a:t>diagonalWins</a:t>
             </a:r>
             <a:r>
-              <a:rPr lang="en-US" sz="2600" b="0" dirty="0">
+              <a:rPr lang="en-US" sz="2300" b="0" dirty="0">
                 <a:solidFill>
                   <a:srgbClr val="CCCCCC"/>
                 </a:solidFill>
@@ -4774,7 +4794,7 @@
               <a:t> </a:t>
             </a:r>
             <a:r>
-              <a:rPr lang="en-US" sz="2600" b="0" dirty="0">
+              <a:rPr lang="en-US" sz="2300" b="0" dirty="0">
                 <a:solidFill>
                   <a:srgbClr val="D4D4D4"/>
                 </a:solidFill>
@@ -4784,7 +4804,7 @@
               <a:t>=</a:t>
             </a:r>
             <a:r>
-              <a:rPr lang="en-US" sz="2600" b="0" dirty="0">
+              <a:rPr lang="en-US" sz="2300" b="0" dirty="0">
                 <a:solidFill>
                   <a:srgbClr val="CCCCCC"/>
                 </a:solidFill>
@@ -4794,7 +4814,7 @@
               <a:t> </a:t>
             </a:r>
             <a:r>
-              <a:rPr lang="en-US" sz="2600" b="0" dirty="0">
+              <a:rPr lang="en-US" sz="2300" b="0" dirty="0">
                 <a:solidFill>
                   <a:srgbClr val="B5CEA8"/>
                 </a:solidFill>
@@ -4804,7 +4824,7 @@
               <a:t>2</a:t>
             </a:r>
             <a:r>
-              <a:rPr lang="en-US" sz="2600" b="0" dirty="0">
+              <a:rPr lang="en-US" sz="2300" b="0" dirty="0">
                 <a:solidFill>
                   <a:srgbClr val="CCCCCC"/>
                 </a:solidFill>
@@ -4814,7 +4834,7 @@
               <a:t> </a:t>
             </a:r>
             <a:r>
-              <a:rPr lang="en-US" sz="2600" b="0" dirty="0">
+              <a:rPr lang="en-US" sz="2300" b="0" dirty="0">
                 <a:solidFill>
                   <a:srgbClr val="D4D4D4"/>
                 </a:solidFill>
@@ -4824,7 +4844,7 @@
               <a:t>*</a:t>
             </a:r>
             <a:r>
-              <a:rPr lang="en-US" sz="2600" b="0" dirty="0">
+              <a:rPr lang="en-US" sz="2300" b="0" dirty="0">
                 <a:solidFill>
                   <a:srgbClr val="CCCCCC"/>
                 </a:solidFill>
@@ -4834,7 +4854,7 @@
               <a:t> ((</a:t>
             </a:r>
             <a:r>
-              <a:rPr lang="en-US" sz="2600" b="0" dirty="0">
+              <a:rPr lang="en-US" sz="2300" b="0" dirty="0">
                 <a:solidFill>
                   <a:srgbClr val="4FC1FF"/>
                 </a:solidFill>
@@ -4844,7 +4864,7 @@
               <a:t>NUMBER_OF_COLUMNS</a:t>
             </a:r>
             <a:r>
-              <a:rPr lang="en-US" sz="2600" b="0" dirty="0">
+              <a:rPr lang="en-US" sz="2300" b="0" dirty="0">
                 <a:solidFill>
                   <a:srgbClr val="CCCCCC"/>
                 </a:solidFill>
@@ -4854,7 +4874,7 @@
               <a:t> </a:t>
             </a:r>
             <a:r>
-              <a:rPr lang="en-US" sz="2600" b="0" dirty="0">
+              <a:rPr lang="en-US" sz="2300" b="0" dirty="0">
                 <a:solidFill>
                   <a:srgbClr val="D4D4D4"/>
                 </a:solidFill>
@@ -4864,7 +4884,7 @@
               <a:t>-</a:t>
             </a:r>
             <a:r>
-              <a:rPr lang="en-US" sz="2600" b="0" dirty="0">
+              <a:rPr lang="en-US" sz="2300" b="0" dirty="0">
                 <a:solidFill>
                   <a:srgbClr val="B5CEA8"/>
                 </a:solidFill>
@@ -4874,7 +4894,7 @@
               <a:t>3</a:t>
             </a:r>
             <a:r>
-              <a:rPr lang="en-US" sz="2600" b="0" dirty="0">
+              <a:rPr lang="en-US" sz="2300" b="0" dirty="0">
                 <a:solidFill>
                   <a:srgbClr val="CCCCCC"/>
                 </a:solidFill>
@@ -4884,7 +4904,7 @@
               <a:t>) </a:t>
             </a:r>
             <a:r>
-              <a:rPr lang="en-US" sz="2600" b="0" dirty="0">
+              <a:rPr lang="en-US" sz="2300" b="0" dirty="0">
                 <a:solidFill>
                   <a:srgbClr val="D4D4D4"/>
                 </a:solidFill>
@@ -4894,7 +4914,7 @@
               <a:t>*</a:t>
             </a:r>
             <a:r>
-              <a:rPr lang="en-US" sz="2600" b="0" dirty="0">
+              <a:rPr lang="en-US" sz="2300" b="0" dirty="0">
                 <a:solidFill>
                   <a:srgbClr val="CCCCCC"/>
                 </a:solidFill>
@@ -4904,7 +4924,7 @@
               <a:t> (</a:t>
             </a:r>
             <a:r>
-              <a:rPr lang="en-US" sz="2600" b="0" dirty="0">
+              <a:rPr lang="en-US" sz="2300" b="0" dirty="0">
                 <a:solidFill>
                   <a:srgbClr val="4FC1FF"/>
                 </a:solidFill>
@@ -4914,7 +4934,7 @@
               <a:t>NUMBER_OF_ROWS</a:t>
             </a:r>
             <a:r>
-              <a:rPr lang="en-US" sz="2600" b="0" dirty="0">
+              <a:rPr lang="en-US" sz="2300" b="0" dirty="0">
                 <a:solidFill>
                   <a:srgbClr val="D4D4D4"/>
                 </a:solidFill>
@@ -4924,7 +4944,7 @@
               <a:t>-</a:t>
             </a:r>
             <a:r>
-              <a:rPr lang="en-US" sz="2600" b="0" dirty="0">
+              <a:rPr lang="en-US" sz="2300" b="0" dirty="0">
                 <a:solidFill>
                   <a:srgbClr val="B5CEA8"/>
                 </a:solidFill>
@@ -4934,7 +4954,7 @@
               <a:t>3</a:t>
             </a:r>
             <a:r>
-              <a:rPr lang="en-US" sz="2600" b="0" dirty="0">
+              <a:rPr lang="en-US" sz="2300" b="0" dirty="0">
                 <a:solidFill>
                   <a:srgbClr val="CCCCCC"/>
                 </a:solidFill>
@@ -4949,7 +4969,7 @@
               <a:buNone/>
             </a:pPr>
             <a:r>
-              <a:rPr lang="en-US" sz="2600" b="0" dirty="0">
+              <a:rPr lang="en-US" sz="2300" b="0" dirty="0">
                 <a:solidFill>
                   <a:srgbClr val="4EC9B0"/>
                 </a:solidFill>
@@ -4959,7 +4979,7 @@
               <a:t>int</a:t>
             </a:r>
             <a:r>
-              <a:rPr lang="en-US" sz="2600" b="0" dirty="0">
+              <a:rPr lang="en-US" sz="2300" b="0" dirty="0">
                 <a:solidFill>
                   <a:srgbClr val="CCCCCC"/>
                 </a:solidFill>
@@ -4969,7 +4989,7 @@
               <a:t> </a:t>
             </a:r>
             <a:r>
-              <a:rPr lang="en-US" sz="2600" b="0" dirty="0" err="1">
+              <a:rPr lang="en-US" sz="2300" b="0" dirty="0" err="1">
                 <a:solidFill>
                   <a:srgbClr val="9CDCFE"/>
                 </a:solidFill>
@@ -4979,7 +4999,7 @@
               <a:t>allPossibleWins</a:t>
             </a:r>
             <a:r>
-              <a:rPr lang="en-US" sz="2600" b="0" dirty="0">
+              <a:rPr lang="en-US" sz="2300" b="0" dirty="0">
                 <a:solidFill>
                   <a:srgbClr val="CCCCCC"/>
                 </a:solidFill>
@@ -4989,7 +5009,7 @@
               <a:t> </a:t>
             </a:r>
             <a:r>
-              <a:rPr lang="en-US" sz="2600" b="0" dirty="0">
+              <a:rPr lang="en-US" sz="2300" b="0" dirty="0">
                 <a:solidFill>
                   <a:srgbClr val="D4D4D4"/>
                 </a:solidFill>
@@ -4999,7 +5019,7 @@
               <a:t>=</a:t>
             </a:r>
             <a:r>
-              <a:rPr lang="en-US" sz="2600" b="0" dirty="0">
+              <a:rPr lang="en-US" sz="2300" b="0" dirty="0">
                 <a:solidFill>
                   <a:srgbClr val="CCCCCC"/>
                 </a:solidFill>
@@ -5009,7 +5029,7 @@
               <a:t> </a:t>
             </a:r>
             <a:r>
-              <a:rPr lang="en-US" sz="2600" b="0" dirty="0" err="1">
+              <a:rPr lang="en-US" sz="2300" b="0" dirty="0" err="1">
                 <a:solidFill>
                   <a:srgbClr val="9CDCFE"/>
                 </a:solidFill>
@@ -5019,7 +5039,7 @@
               <a:t>horizontalWins</a:t>
             </a:r>
             <a:r>
-              <a:rPr lang="en-US" sz="2600" b="0" dirty="0">
+              <a:rPr lang="en-US" sz="2300" b="0" dirty="0">
                 <a:solidFill>
                   <a:srgbClr val="CCCCCC"/>
                 </a:solidFill>
@@ -5029,7 +5049,7 @@
               <a:t> </a:t>
             </a:r>
             <a:r>
-              <a:rPr lang="en-US" sz="2600" b="0" dirty="0">
+              <a:rPr lang="en-US" sz="2300" b="0" dirty="0">
                 <a:solidFill>
                   <a:srgbClr val="D4D4D4"/>
                 </a:solidFill>
@@ -5039,7 +5059,7 @@
               <a:t>+</a:t>
             </a:r>
             <a:r>
-              <a:rPr lang="en-US" sz="2600" b="0" dirty="0">
+              <a:rPr lang="en-US" sz="2300" b="0" dirty="0">
                 <a:solidFill>
                   <a:srgbClr val="CCCCCC"/>
                 </a:solidFill>
@@ -5049,7 +5069,7 @@
               <a:t> </a:t>
             </a:r>
             <a:r>
-              <a:rPr lang="en-US" sz="2600" b="0" dirty="0" err="1">
+              <a:rPr lang="en-US" sz="2300" b="0" dirty="0" err="1">
                 <a:solidFill>
                   <a:srgbClr val="9CDCFE"/>
                 </a:solidFill>
@@ -5059,7 +5079,7 @@
               <a:t>verticalWins</a:t>
             </a:r>
             <a:r>
-              <a:rPr lang="en-US" sz="2600" b="0" dirty="0">
+              <a:rPr lang="en-US" sz="2300" b="0" dirty="0">
                 <a:solidFill>
                   <a:srgbClr val="CCCCCC"/>
                 </a:solidFill>
@@ -5069,7 +5089,7 @@
               <a:t> </a:t>
             </a:r>
             <a:r>
-              <a:rPr lang="en-US" sz="2600" b="0" dirty="0">
+              <a:rPr lang="en-US" sz="2300" b="0" dirty="0">
                 <a:solidFill>
                   <a:srgbClr val="D4D4D4"/>
                 </a:solidFill>
@@ -5079,7 +5099,7 @@
               <a:t>+</a:t>
             </a:r>
             <a:r>
-              <a:rPr lang="en-US" sz="2600" b="0" dirty="0">
+              <a:rPr lang="en-US" sz="2300" b="0" dirty="0">
                 <a:solidFill>
                   <a:srgbClr val="CCCCCC"/>
                 </a:solidFill>
@@ -5089,7 +5109,7 @@
               <a:t> </a:t>
             </a:r>
             <a:r>
-              <a:rPr lang="en-US" sz="2600" b="0" dirty="0" err="1">
+              <a:rPr lang="en-US" sz="2300" b="0" dirty="0" err="1">
                 <a:solidFill>
                   <a:srgbClr val="9CDCFE"/>
                 </a:solidFill>
@@ -5099,7 +5119,7 @@
               <a:t>diagonalWins</a:t>
             </a:r>
             <a:r>
-              <a:rPr lang="en-US" sz="2600" b="0" dirty="0">
+              <a:rPr lang="en-US" sz="2300" b="0" dirty="0">
                 <a:solidFill>
                   <a:srgbClr val="CCCCCC"/>
                 </a:solidFill>
@@ -5108,12 +5128,95 @@
               </a:rPr>
               <a:t>;</a:t>
             </a:r>
-          </a:p>
-          <a:p>
-            <a:endParaRPr lang="de-AT" dirty="0"/>
           </a:p>
         </p:txBody>
       </p:sp>
+      <p:grpSp>
+        <p:nvGrpSpPr>
+          <p:cNvPr id="7" name="Gruppieren 6">
+            <a:extLst>
+              <a:ext uri="{FF2B5EF4-FFF2-40B4-BE49-F238E27FC236}">
+                <a16:creationId xmlns:a16="http://schemas.microsoft.com/office/drawing/2014/main" id="{3452326E-5C08-35CC-E49E-75EEF7D18A9C}"/>
+              </a:ext>
+            </a:extLst>
+          </p:cNvPr>
+          <p:cNvGrpSpPr/>
+          <p:nvPr/>
+        </p:nvGrpSpPr>
+        <p:grpSpPr>
+          <a:xfrm>
+            <a:off x="8209280" y="3103401"/>
+            <a:ext cx="3982720" cy="2691846"/>
+            <a:chOff x="8209280" y="3103401"/>
+            <a:chExt cx="3982720" cy="2691846"/>
+          </a:xfrm>
+        </p:grpSpPr>
+        <p:pic>
+          <p:nvPicPr>
+            <p:cNvPr id="5" name="Grafik 4">
+              <a:extLst>
+                <a:ext uri="{FF2B5EF4-FFF2-40B4-BE49-F238E27FC236}">
+                  <a16:creationId xmlns:a16="http://schemas.microsoft.com/office/drawing/2014/main" id="{F577DA5C-C901-6550-8F65-88A914E0899A}"/>
+                </a:ext>
+              </a:extLst>
+            </p:cNvPr>
+            <p:cNvPicPr>
+              <a:picLocks noChangeAspect="1"/>
+            </p:cNvPicPr>
+            <p:nvPr/>
+          </p:nvPicPr>
+          <p:blipFill>
+            <a:blip r:embed="rId2"/>
+            <a:stretch>
+              <a:fillRect/>
+            </a:stretch>
+          </p:blipFill>
+          <p:spPr>
+            <a:xfrm>
+              <a:off x="8651760" y="3103401"/>
+              <a:ext cx="3449517" cy="2433799"/>
+            </a:xfrm>
+            <a:prstGeom prst="rect">
+              <a:avLst/>
+            </a:prstGeom>
+          </p:spPr>
+        </p:pic>
+        <p:sp>
+          <p:nvSpPr>
+            <p:cNvPr id="6" name="Textfeld 5">
+              <a:extLst>
+                <a:ext uri="{FF2B5EF4-FFF2-40B4-BE49-F238E27FC236}">
+                  <a16:creationId xmlns:a16="http://schemas.microsoft.com/office/drawing/2014/main" id="{03AF0A26-029E-379A-97C3-F4297DF21CAF}"/>
+                </a:ext>
+              </a:extLst>
+            </p:cNvPr>
+            <p:cNvSpPr txBox="1"/>
+            <p:nvPr/>
+          </p:nvSpPr>
+          <p:spPr>
+            <a:xfrm>
+              <a:off x="8209280" y="5549026"/>
+              <a:ext cx="3982720" cy="246221"/>
+            </a:xfrm>
+            <a:prstGeom prst="rect">
+              <a:avLst/>
+            </a:prstGeom>
+            <a:noFill/>
+          </p:spPr>
+          <p:txBody>
+            <a:bodyPr wrap="square" rtlCol="0">
+              <a:spAutoFit/>
+            </a:bodyPr>
+            <a:lstStyle/>
+            <a:p>
+              <a:r>
+                <a:rPr lang="de-AT" sz="1000" dirty="0"/>
+                <a:t>https://roboticsproject.readthedocs.io/en/latest/ConnectFourAlgorithm</a:t>
+              </a:r>
+            </a:p>
+          </p:txBody>
+        </p:sp>
+      </p:grpSp>
     </p:spTree>
     <p:extLst>
       <p:ext uri="{BB962C8B-B14F-4D97-AF65-F5344CB8AC3E}">
@@ -7229,7 +7332,12 @@
             <p:ph type="title"/>
           </p:nvPr>
         </p:nvSpPr>
-        <p:spPr/>
+        <p:spPr>
+          <a:xfrm>
+            <a:off x="0" y="-304901"/>
+            <a:ext cx="10515600" cy="1325563"/>
+          </a:xfrm>
+        </p:spPr>
         <p:txBody>
           <a:bodyPr/>
           <a:lstStyle/>
@@ -7290,13 +7398,43 @@
           <a:bodyPr/>
           <a:lstStyle/>
           <a:p>
-            <a:r>
-              <a:rPr lang="de-AT" dirty="0"/>
-              <a:t>TODO</a:t>
-            </a:r>
+            <a:pPr marL="0" indent="0">
+              <a:buNone/>
+            </a:pPr>
+            <a:endParaRPr lang="de-AT" b="1" dirty="0"/>
           </a:p>
         </p:txBody>
       </p:sp>
+      <p:pic>
+        <p:nvPicPr>
+          <p:cNvPr id="5" name="Grafik 4">
+            <a:extLst>
+              <a:ext uri="{FF2B5EF4-FFF2-40B4-BE49-F238E27FC236}">
+                <a16:creationId xmlns:a16="http://schemas.microsoft.com/office/drawing/2014/main" id="{EF51265C-B9AB-4EAD-CC68-A384C1CE93E8}"/>
+              </a:ext>
+            </a:extLst>
+          </p:cNvPr>
+          <p:cNvPicPr>
+            <a:picLocks noChangeAspect="1"/>
+          </p:cNvPicPr>
+          <p:nvPr/>
+        </p:nvPicPr>
+        <p:blipFill>
+          <a:blip r:embed="rId2"/>
+          <a:stretch>
+            <a:fillRect/>
+          </a:stretch>
+        </p:blipFill>
+        <p:spPr>
+          <a:xfrm>
+            <a:off x="317500" y="618638"/>
+            <a:ext cx="11557000" cy="6239362"/>
+          </a:xfrm>
+          <a:prstGeom prst="rect">
+            <a:avLst/>
+          </a:prstGeom>
+        </p:spPr>
+      </p:pic>
     </p:spTree>
     <p:extLst>
       <p:ext uri="{BB962C8B-B14F-4D97-AF65-F5344CB8AC3E}">

</xml_diff>

<commit_message>
adapted presentation tree based slide
</commit_message>
<xml_diff>
--- a/doc/ConnectFourPresentationDraft.pptx
+++ b/doc/ConnectFourPresentationDraft.pptx
@@ -274,7 +274,7 @@
           <a:p>
             <a:fld id="{CCFEB230-CD1F-447C-B1A3-C00E1A95CFE7}" type="datetimeFigureOut">
               <a:rPr lang="de-AT" smtClean="0"/>
-              <a:t>14.05.2024</a:t>
+              <a:t>15.05.2024</a:t>
             </a:fld>
             <a:endParaRPr lang="de-AT"/>
           </a:p>
@@ -1797,6 +1797,1451 @@
           <a:bodyPr/>
           <a:lstStyle/>
           <a:p>
+            <a:r>
+              <a:rPr lang="de-AT" dirty="0"/>
+              <a:t>Parameters </a:t>
+            </a:r>
+            <a:r>
+              <a:rPr lang="de-AT" dirty="0" err="1"/>
+              <a:t>are</a:t>
+            </a:r>
+            <a:r>
+              <a:rPr lang="de-AT" dirty="0"/>
+              <a:t> </a:t>
+            </a:r>
+            <a:r>
+              <a:rPr lang="de-AT" dirty="0" err="1"/>
+              <a:t>only</a:t>
+            </a:r>
+            <a:r>
+              <a:rPr lang="de-AT" dirty="0"/>
+              <a:t> </a:t>
+            </a:r>
+            <a:r>
+              <a:rPr lang="de-AT" dirty="0" err="1"/>
+              <a:t>propagated</a:t>
+            </a:r>
+            <a:r>
+              <a:rPr lang="de-AT" dirty="0"/>
+              <a:t> </a:t>
+            </a:r>
+            <a:r>
+              <a:rPr lang="de-AT" dirty="0" err="1"/>
+              <a:t>upward</a:t>
+            </a:r>
+            <a:r>
+              <a:rPr lang="de-AT" dirty="0"/>
+              <a:t> (</a:t>
+            </a:r>
+            <a:r>
+              <a:rPr lang="el-GR" dirty="0"/>
+              <a:t>α</a:t>
+            </a:r>
+            <a:r>
+              <a:rPr lang="de-AT" dirty="0"/>
+              <a:t>/</a:t>
+            </a:r>
+            <a:r>
+              <a:rPr lang="el-GR" dirty="0"/>
+              <a:t>β</a:t>
+            </a:r>
+            <a:r>
+              <a:rPr lang="de-AT" dirty="0"/>
+              <a:t>), 8 follow </a:t>
+            </a:r>
+            <a:r>
+              <a:rPr lang="de-AT" dirty="0" err="1"/>
+              <a:t>up</a:t>
+            </a:r>
+            <a:r>
+              <a:rPr lang="de-AT" dirty="0"/>
+              <a:t> </a:t>
+            </a:r>
+            <a:r>
+              <a:rPr lang="de-AT" dirty="0" err="1"/>
+              <a:t>gamestate</a:t>
+            </a:r>
+            <a:r>
+              <a:rPr lang="de-AT" dirty="0"/>
+              <a:t> after </a:t>
+            </a:r>
+            <a:r>
+              <a:rPr lang="de-AT" dirty="0" err="1"/>
+              <a:t>every</a:t>
+            </a:r>
+            <a:r>
+              <a:rPr lang="de-AT" dirty="0"/>
+              <a:t> </a:t>
+            </a:r>
+            <a:r>
+              <a:rPr lang="de-AT" dirty="0" err="1"/>
+              <a:t>move</a:t>
+            </a:r>
+            <a:endParaRPr lang="de-AT" dirty="0"/>
+          </a:p>
+          <a:p>
+            <a:r>
+              <a:rPr lang="de-AT" dirty="0"/>
+              <a:t>Order </a:t>
+            </a:r>
+            <a:r>
+              <a:rPr lang="de-AT" dirty="0" err="1"/>
+              <a:t>of</a:t>
+            </a:r>
+            <a:r>
+              <a:rPr lang="de-AT" dirty="0"/>
+              <a:t> </a:t>
+            </a:r>
+            <a:r>
+              <a:rPr lang="de-AT" dirty="0" err="1"/>
+              <a:t>moves</a:t>
+            </a:r>
+            <a:r>
+              <a:rPr lang="de-AT" dirty="0"/>
+              <a:t> </a:t>
+            </a:r>
+            <a:r>
+              <a:rPr lang="de-AT" dirty="0" err="1"/>
+              <a:t>matters</a:t>
+            </a:r>
+            <a:r>
+              <a:rPr lang="de-AT" dirty="0"/>
+              <a:t> – </a:t>
+            </a:r>
+            <a:r>
+              <a:rPr lang="de-AT" dirty="0" err="1"/>
+              <a:t>depends</a:t>
+            </a:r>
+            <a:r>
+              <a:rPr lang="de-AT" dirty="0"/>
+              <a:t> on </a:t>
+            </a:r>
+            <a:r>
+              <a:rPr lang="de-AT" dirty="0" err="1"/>
+              <a:t>how</a:t>
+            </a:r>
+            <a:r>
+              <a:rPr lang="de-AT" dirty="0"/>
+              <a:t> </a:t>
+            </a:r>
+            <a:r>
+              <a:rPr lang="de-AT" dirty="0" err="1"/>
+              <a:t>likely</a:t>
+            </a:r>
+            <a:r>
+              <a:rPr lang="de-AT" dirty="0"/>
+              <a:t> a </a:t>
+            </a:r>
+            <a:r>
+              <a:rPr lang="de-AT" dirty="0" err="1"/>
+              <a:t>move</a:t>
+            </a:r>
+            <a:r>
+              <a:rPr lang="de-AT" dirty="0"/>
+              <a:t> </a:t>
+            </a:r>
+            <a:r>
+              <a:rPr lang="de-AT" dirty="0" err="1"/>
+              <a:t>is</a:t>
+            </a:r>
+            <a:endParaRPr lang="de-AT" dirty="0"/>
+          </a:p>
+          <a:p>
+            <a:r>
+              <a:rPr lang="el-GR" dirty="0"/>
+              <a:t>α</a:t>
+            </a:r>
+            <a:r>
+              <a:rPr lang="de-AT" dirty="0"/>
+              <a:t> … </a:t>
+            </a:r>
+            <a:r>
+              <a:rPr lang="de-AT" dirty="0" err="1"/>
+              <a:t>best</a:t>
+            </a:r>
+            <a:r>
+              <a:rPr lang="de-AT" dirty="0"/>
+              <a:t> score </a:t>
+            </a:r>
+            <a:r>
+              <a:rPr lang="de-AT" dirty="0" err="1"/>
+              <a:t>the</a:t>
+            </a:r>
+            <a:r>
+              <a:rPr lang="de-AT" dirty="0"/>
+              <a:t> </a:t>
+            </a:r>
+            <a:r>
+              <a:rPr lang="de-AT" dirty="0" err="1"/>
+              <a:t>max</a:t>
+            </a:r>
+            <a:r>
+              <a:rPr lang="de-AT" dirty="0"/>
+              <a:t> </a:t>
+            </a:r>
+            <a:r>
+              <a:rPr lang="de-AT" dirty="0" err="1"/>
+              <a:t>player</a:t>
+            </a:r>
+            <a:r>
+              <a:rPr lang="de-AT" dirty="0"/>
+              <a:t> </a:t>
+            </a:r>
+            <a:r>
+              <a:rPr lang="de-AT" dirty="0" err="1"/>
+              <a:t>can</a:t>
+            </a:r>
+            <a:r>
+              <a:rPr lang="de-AT" dirty="0"/>
+              <a:t> </a:t>
+            </a:r>
+            <a:r>
+              <a:rPr lang="de-AT" dirty="0" err="1"/>
+              <a:t>currently</a:t>
+            </a:r>
+            <a:r>
+              <a:rPr lang="de-AT" dirty="0"/>
+              <a:t> </a:t>
+            </a:r>
+            <a:r>
+              <a:rPr lang="de-AT" dirty="0" err="1"/>
+              <a:t>achieve</a:t>
+            </a:r>
+            <a:endParaRPr lang="de-AT" dirty="0"/>
+          </a:p>
+          <a:p>
+            <a:r>
+              <a:rPr lang="el-GR" dirty="0"/>
+              <a:t>Β</a:t>
+            </a:r>
+            <a:r>
+              <a:rPr lang="de-AT" dirty="0"/>
+              <a:t> … </a:t>
+            </a:r>
+            <a:r>
+              <a:rPr lang="de-AT" dirty="0" err="1"/>
+              <a:t>best</a:t>
+            </a:r>
+            <a:r>
+              <a:rPr lang="de-AT" dirty="0"/>
+              <a:t> score </a:t>
+            </a:r>
+            <a:r>
+              <a:rPr lang="de-AT" dirty="0" err="1"/>
+              <a:t>the</a:t>
+            </a:r>
+            <a:r>
+              <a:rPr lang="de-AT" dirty="0"/>
+              <a:t> min </a:t>
+            </a:r>
+            <a:r>
+              <a:rPr lang="de-AT" dirty="0" err="1"/>
+              <a:t>player</a:t>
+            </a:r>
+            <a:r>
+              <a:rPr lang="de-AT" dirty="0"/>
+              <a:t> </a:t>
+            </a:r>
+            <a:r>
+              <a:rPr lang="de-AT" dirty="0" err="1"/>
+              <a:t>can</a:t>
+            </a:r>
+            <a:r>
+              <a:rPr lang="de-AT" dirty="0"/>
+              <a:t> </a:t>
+            </a:r>
+            <a:r>
+              <a:rPr lang="de-AT" dirty="0" err="1"/>
+              <a:t>currently</a:t>
+            </a:r>
+            <a:r>
+              <a:rPr lang="de-AT" dirty="0"/>
+              <a:t> </a:t>
+            </a:r>
+            <a:r>
+              <a:rPr lang="de-AT" dirty="0" err="1"/>
+              <a:t>achieve</a:t>
+            </a:r>
+            <a:endParaRPr lang="de-AT" dirty="0"/>
+          </a:p>
+          <a:p>
+            <a:endParaRPr lang="de-AT" dirty="0"/>
+          </a:p>
+          <a:p>
+            <a:r>
+              <a:rPr lang="de-AT" dirty="0" err="1"/>
+              <a:t>Condition</a:t>
+            </a:r>
+            <a:r>
+              <a:rPr lang="de-AT" dirty="0"/>
+              <a:t> </a:t>
+            </a:r>
+            <a:r>
+              <a:rPr lang="de-AT" dirty="0" err="1"/>
+              <a:t>is</a:t>
+            </a:r>
+            <a:r>
+              <a:rPr lang="de-AT" dirty="0"/>
+              <a:t> </a:t>
+            </a:r>
+            <a:r>
+              <a:rPr lang="de-AT" dirty="0" err="1"/>
+              <a:t>only</a:t>
+            </a:r>
+            <a:r>
+              <a:rPr lang="de-AT" dirty="0"/>
+              <a:t> </a:t>
+            </a:r>
+            <a:r>
+              <a:rPr lang="de-AT" dirty="0" err="1"/>
+              <a:t>explore</a:t>
+            </a:r>
+            <a:r>
+              <a:rPr lang="de-AT" dirty="0"/>
+              <a:t> </a:t>
+            </a:r>
+            <a:r>
+              <a:rPr lang="de-AT" dirty="0" err="1"/>
+              <a:t>trees</a:t>
+            </a:r>
+            <a:r>
+              <a:rPr lang="de-AT" dirty="0"/>
+              <a:t> </a:t>
+            </a:r>
+            <a:r>
+              <a:rPr lang="de-AT" dirty="0" err="1"/>
+              <a:t>were</a:t>
+            </a:r>
+            <a:r>
+              <a:rPr lang="de-AT" dirty="0"/>
+              <a:t> </a:t>
+            </a:r>
+            <a:r>
+              <a:rPr lang="el-GR" dirty="0"/>
+              <a:t>α</a:t>
+            </a:r>
+            <a:r>
+              <a:rPr lang="de-AT" dirty="0"/>
+              <a:t> &gt;= </a:t>
+            </a:r>
+            <a:r>
+              <a:rPr lang="el-GR" dirty="0"/>
+              <a:t>β</a:t>
+            </a:r>
+            <a:r>
+              <a:rPr lang="de-AT" dirty="0"/>
+              <a:t> – </a:t>
+            </a:r>
+            <a:r>
+              <a:rPr lang="de-AT" dirty="0" err="1"/>
+              <a:t>if</a:t>
+            </a:r>
+            <a:r>
+              <a:rPr lang="de-AT" dirty="0"/>
+              <a:t> </a:t>
+            </a:r>
+            <a:r>
+              <a:rPr lang="de-AT" dirty="0" err="1"/>
+              <a:t>it</a:t>
+            </a:r>
+            <a:r>
+              <a:rPr lang="de-AT" dirty="0"/>
+              <a:t> </a:t>
+            </a:r>
+            <a:r>
+              <a:rPr lang="de-AT" dirty="0" err="1"/>
+              <a:t>is</a:t>
+            </a:r>
+            <a:r>
+              <a:rPr lang="de-AT" dirty="0"/>
+              <a:t> </a:t>
+            </a:r>
+            <a:r>
+              <a:rPr lang="de-AT" dirty="0" err="1"/>
+              <a:t>fullfilled</a:t>
+            </a:r>
+            <a:r>
+              <a:rPr lang="de-AT" dirty="0"/>
+              <a:t> </a:t>
+            </a:r>
+            <a:r>
+              <a:rPr lang="de-AT" dirty="0" err="1"/>
+              <a:t>we</a:t>
+            </a:r>
+            <a:r>
+              <a:rPr lang="de-AT" dirty="0"/>
+              <a:t> do not </a:t>
+            </a:r>
+            <a:r>
+              <a:rPr lang="de-AT" dirty="0" err="1"/>
+              <a:t>evaluate</a:t>
+            </a:r>
+            <a:r>
+              <a:rPr lang="de-AT" dirty="0"/>
+              <a:t> </a:t>
+            </a:r>
+            <a:r>
+              <a:rPr lang="de-AT" dirty="0" err="1"/>
+              <a:t>following</a:t>
+            </a:r>
+            <a:r>
+              <a:rPr lang="de-AT" dirty="0"/>
+              <a:t> </a:t>
+            </a:r>
+            <a:r>
+              <a:rPr lang="de-AT" dirty="0" err="1"/>
+              <a:t>subtrees</a:t>
+            </a:r>
+            <a:endParaRPr lang="de-AT" dirty="0"/>
+          </a:p>
+          <a:p>
+            <a:endParaRPr lang="de-AT" dirty="0"/>
+          </a:p>
+          <a:p>
+            <a:r>
+              <a:rPr lang="de-AT" dirty="0"/>
+              <a:t>Alpha </a:t>
+            </a:r>
+            <a:r>
+              <a:rPr lang="de-AT" dirty="0" err="1"/>
+              <a:t>only</a:t>
+            </a:r>
+            <a:r>
+              <a:rPr lang="de-AT" dirty="0"/>
+              <a:t> </a:t>
+            </a:r>
+            <a:r>
+              <a:rPr lang="de-AT" dirty="0" err="1"/>
+              <a:t>changes</a:t>
+            </a:r>
+            <a:r>
+              <a:rPr lang="de-AT" dirty="0"/>
+              <a:t> on </a:t>
+            </a:r>
+            <a:r>
+              <a:rPr lang="de-AT" dirty="0" err="1"/>
+              <a:t>first</a:t>
+            </a:r>
+            <a:r>
+              <a:rPr lang="de-AT" dirty="0"/>
+              <a:t> and </a:t>
+            </a:r>
+            <a:r>
+              <a:rPr lang="de-AT" dirty="0" err="1"/>
+              <a:t>third</a:t>
+            </a:r>
+            <a:r>
+              <a:rPr lang="de-AT" dirty="0"/>
+              <a:t> </a:t>
+            </a:r>
+            <a:r>
+              <a:rPr lang="de-AT" dirty="0" err="1"/>
+              <a:t>level</a:t>
+            </a:r>
+            <a:br>
+              <a:rPr lang="de-AT" dirty="0"/>
+            </a:br>
+            <a:r>
+              <a:rPr lang="de-AT" dirty="0"/>
+              <a:t>Beta </a:t>
+            </a:r>
+            <a:r>
+              <a:rPr lang="de-AT" dirty="0" err="1"/>
+              <a:t>only</a:t>
+            </a:r>
+            <a:r>
+              <a:rPr lang="de-AT" dirty="0"/>
+              <a:t> on </a:t>
+            </a:r>
+            <a:r>
+              <a:rPr lang="de-AT" dirty="0" err="1"/>
+              <a:t>second</a:t>
+            </a:r>
+            <a:r>
+              <a:rPr lang="de-AT" dirty="0"/>
+              <a:t> </a:t>
+            </a:r>
+            <a:r>
+              <a:rPr lang="de-AT" dirty="0" err="1"/>
+              <a:t>level</a:t>
+            </a:r>
+            <a:endParaRPr lang="de-AT" dirty="0"/>
+          </a:p>
+          <a:p>
+            <a:endParaRPr lang="de-AT" dirty="0"/>
+          </a:p>
+          <a:p>
+            <a:r>
+              <a:rPr lang="de-AT" dirty="0" err="1"/>
+              <a:t>Since</a:t>
+            </a:r>
+            <a:r>
+              <a:rPr lang="de-AT" dirty="0"/>
+              <a:t> in </a:t>
+            </a:r>
+            <a:r>
+              <a:rPr lang="de-AT" dirty="0" err="1"/>
+              <a:t>the</a:t>
+            </a:r>
+            <a:r>
+              <a:rPr lang="de-AT" dirty="0"/>
+              <a:t> </a:t>
+            </a:r>
+            <a:r>
+              <a:rPr lang="de-AT" dirty="0" err="1"/>
+              <a:t>second</a:t>
+            </a:r>
+            <a:r>
+              <a:rPr lang="de-AT" dirty="0"/>
+              <a:t> </a:t>
+            </a:r>
+            <a:r>
+              <a:rPr lang="de-AT" dirty="0" err="1"/>
+              <a:t>step</a:t>
+            </a:r>
+            <a:r>
+              <a:rPr lang="de-AT" dirty="0"/>
+              <a:t> </a:t>
+            </a:r>
+            <a:r>
+              <a:rPr lang="de-AT" dirty="0" err="1"/>
+              <a:t>our</a:t>
+            </a:r>
+            <a:r>
+              <a:rPr lang="de-AT" dirty="0"/>
+              <a:t> </a:t>
+            </a:r>
+            <a:r>
+              <a:rPr lang="de-AT" dirty="0" err="1"/>
+              <a:t>condition</a:t>
+            </a:r>
+            <a:r>
+              <a:rPr lang="de-AT" dirty="0"/>
+              <a:t> </a:t>
+            </a:r>
+            <a:r>
+              <a:rPr lang="de-AT" dirty="0" err="1"/>
+              <a:t>is</a:t>
+            </a:r>
+            <a:r>
+              <a:rPr lang="de-AT" dirty="0"/>
+              <a:t> </a:t>
+            </a:r>
+            <a:r>
+              <a:rPr lang="de-AT" dirty="0" err="1"/>
+              <a:t>fullfilled</a:t>
+            </a:r>
+            <a:r>
+              <a:rPr lang="de-AT" dirty="0"/>
+              <a:t> </a:t>
+            </a:r>
+            <a:r>
+              <a:rPr lang="de-AT" dirty="0" err="1"/>
+              <a:t>we</a:t>
+            </a:r>
+            <a:r>
+              <a:rPr lang="de-AT" dirty="0"/>
+              <a:t> </a:t>
+            </a:r>
+            <a:r>
+              <a:rPr lang="de-AT" dirty="0" err="1"/>
+              <a:t>propagate</a:t>
+            </a:r>
+            <a:r>
+              <a:rPr lang="de-AT" dirty="0"/>
+              <a:t> </a:t>
+            </a:r>
+            <a:r>
+              <a:rPr lang="de-AT" dirty="0" err="1"/>
+              <a:t>the</a:t>
+            </a:r>
+            <a:r>
+              <a:rPr lang="de-AT" dirty="0"/>
+              <a:t> </a:t>
+            </a:r>
+            <a:r>
+              <a:rPr lang="de-AT" dirty="0" err="1"/>
+              <a:t>values</a:t>
+            </a:r>
+            <a:r>
+              <a:rPr lang="de-AT" dirty="0"/>
+              <a:t> back </a:t>
+            </a:r>
+            <a:r>
+              <a:rPr lang="de-AT" dirty="0" err="1"/>
+              <a:t>to</a:t>
+            </a:r>
+            <a:r>
+              <a:rPr lang="de-AT" dirty="0"/>
+              <a:t> </a:t>
+            </a:r>
+            <a:r>
+              <a:rPr lang="de-AT" dirty="0" err="1"/>
+              <a:t>the</a:t>
+            </a:r>
+            <a:r>
+              <a:rPr lang="de-AT" dirty="0"/>
+              <a:t> top</a:t>
+            </a:r>
+          </a:p>
+          <a:p>
+            <a:pPr marL="171450" indent="-171450">
+              <a:buFontTx/>
+              <a:buChar char="-"/>
+            </a:pPr>
+            <a:r>
+              <a:rPr lang="de-AT" dirty="0"/>
+              <a:t>In </a:t>
+            </a:r>
+            <a:r>
+              <a:rPr lang="de-AT" dirty="0" err="1"/>
+              <a:t>this</a:t>
+            </a:r>
+            <a:r>
+              <a:rPr lang="de-AT" dirty="0"/>
+              <a:t> </a:t>
+            </a:r>
+            <a:r>
+              <a:rPr lang="de-AT" dirty="0" err="1"/>
+              <a:t>instance</a:t>
+            </a:r>
+            <a:r>
+              <a:rPr lang="de-AT" dirty="0"/>
+              <a:t> </a:t>
+            </a:r>
+            <a:r>
+              <a:rPr lang="de-AT" dirty="0" err="1"/>
+              <a:t>we</a:t>
+            </a:r>
+            <a:r>
+              <a:rPr lang="de-AT" dirty="0"/>
+              <a:t> </a:t>
+            </a:r>
+            <a:r>
+              <a:rPr lang="de-AT" dirty="0" err="1"/>
+              <a:t>immediatly</a:t>
+            </a:r>
+            <a:r>
+              <a:rPr lang="de-AT" dirty="0"/>
+              <a:t> </a:t>
+            </a:r>
+            <a:r>
+              <a:rPr lang="de-AT" dirty="0" err="1"/>
+              <a:t>prune</a:t>
+            </a:r>
+            <a:r>
+              <a:rPr lang="de-AT" dirty="0"/>
+              <a:t> </a:t>
+            </a:r>
+            <a:r>
+              <a:rPr lang="de-AT" dirty="0" err="1"/>
+              <a:t>the</a:t>
+            </a:r>
+            <a:r>
+              <a:rPr lang="de-AT" dirty="0"/>
+              <a:t> </a:t>
+            </a:r>
+            <a:r>
+              <a:rPr lang="de-AT" dirty="0" err="1"/>
+              <a:t>branch</a:t>
+            </a:r>
+            <a:r>
+              <a:rPr lang="de-AT" dirty="0"/>
+              <a:t> </a:t>
+            </a:r>
+            <a:r>
+              <a:rPr lang="de-AT" dirty="0" err="1"/>
+              <a:t>that</a:t>
+            </a:r>
+            <a:r>
+              <a:rPr lang="de-AT" dirty="0"/>
+              <a:t> </a:t>
+            </a:r>
+            <a:r>
+              <a:rPr lang="de-AT" dirty="0" err="1"/>
+              <a:t>is</a:t>
+            </a:r>
+            <a:r>
+              <a:rPr lang="de-AT" dirty="0"/>
+              <a:t> not </a:t>
+            </a:r>
+            <a:r>
+              <a:rPr lang="de-AT" dirty="0" err="1"/>
+              <a:t>yet</a:t>
+            </a:r>
+            <a:r>
+              <a:rPr lang="de-AT" dirty="0"/>
+              <a:t> </a:t>
+            </a:r>
+            <a:r>
+              <a:rPr lang="de-AT" dirty="0" err="1"/>
+              <a:t>evaluated</a:t>
+            </a:r>
+            <a:endParaRPr lang="de-AT" dirty="0"/>
+          </a:p>
+          <a:p>
+            <a:pPr marL="171450" indent="-171450">
+              <a:buFontTx/>
+              <a:buChar char="-"/>
+            </a:pPr>
+            <a:endParaRPr lang="de-AT" dirty="0"/>
+          </a:p>
+          <a:p>
+            <a:pPr marL="0" indent="0">
+              <a:buFontTx/>
+              <a:buNone/>
+            </a:pPr>
+            <a:r>
+              <a:rPr lang="de-AT" dirty="0"/>
+              <a:t>So </a:t>
+            </a:r>
+            <a:r>
+              <a:rPr lang="de-AT" dirty="0" err="1"/>
+              <a:t>for</a:t>
+            </a:r>
+            <a:r>
+              <a:rPr lang="de-AT" dirty="0"/>
+              <a:t> </a:t>
+            </a:r>
+            <a:r>
+              <a:rPr lang="de-AT" dirty="0" err="1"/>
+              <a:t>our</a:t>
+            </a:r>
+            <a:r>
+              <a:rPr lang="de-AT" dirty="0"/>
+              <a:t> </a:t>
+            </a:r>
+            <a:r>
+              <a:rPr lang="de-AT" dirty="0" err="1"/>
+              <a:t>example</a:t>
+            </a:r>
+            <a:r>
+              <a:rPr lang="de-AT" dirty="0"/>
+              <a:t> </a:t>
+            </a:r>
+            <a:r>
+              <a:rPr lang="de-AT" dirty="0" err="1"/>
+              <a:t>the</a:t>
+            </a:r>
+            <a:r>
+              <a:rPr lang="de-AT" dirty="0"/>
+              <a:t> </a:t>
+            </a:r>
+            <a:r>
+              <a:rPr lang="de-AT" dirty="0" err="1"/>
+              <a:t>first</a:t>
+            </a:r>
+            <a:r>
+              <a:rPr lang="de-AT" dirty="0"/>
+              <a:t> </a:t>
+            </a:r>
+            <a:r>
+              <a:rPr lang="de-AT" dirty="0" err="1"/>
+              <a:t>branch</a:t>
+            </a:r>
+            <a:r>
+              <a:rPr lang="de-AT" dirty="0"/>
+              <a:t> </a:t>
+            </a:r>
+            <a:r>
+              <a:rPr lang="de-AT" dirty="0" err="1"/>
+              <a:t>is</a:t>
+            </a:r>
+            <a:r>
+              <a:rPr lang="de-AT" dirty="0"/>
+              <a:t> </a:t>
+            </a:r>
+            <a:r>
+              <a:rPr lang="de-AT" dirty="0" err="1"/>
+              <a:t>evaluated</a:t>
+            </a:r>
+            <a:r>
+              <a:rPr lang="de-AT" dirty="0"/>
+              <a:t> </a:t>
+            </a:r>
+            <a:r>
+              <a:rPr lang="de-AT" dirty="0" err="1"/>
+              <a:t>as</a:t>
+            </a:r>
+            <a:r>
+              <a:rPr lang="de-AT" dirty="0"/>
+              <a:t> </a:t>
+            </a:r>
+            <a:r>
+              <a:rPr lang="de-AT" dirty="0" err="1"/>
+              <a:t>follows</a:t>
+            </a:r>
+            <a:r>
+              <a:rPr lang="de-AT" dirty="0"/>
+              <a:t>:</a:t>
+            </a:r>
+          </a:p>
+          <a:p>
+            <a:pPr marL="0" indent="0">
+              <a:buFontTx/>
+              <a:buNone/>
+            </a:pPr>
+            <a:r>
+              <a:rPr lang="de-AT" dirty="0" err="1"/>
+              <a:t>For</a:t>
+            </a:r>
+            <a:r>
+              <a:rPr lang="de-AT" dirty="0"/>
+              <a:t> </a:t>
+            </a:r>
+            <a:r>
+              <a:rPr lang="de-AT" dirty="0" err="1"/>
+              <a:t>the</a:t>
+            </a:r>
+            <a:r>
+              <a:rPr lang="de-AT" dirty="0"/>
+              <a:t> </a:t>
+            </a:r>
+            <a:r>
+              <a:rPr lang="de-AT" dirty="0" err="1"/>
+              <a:t>first</a:t>
+            </a:r>
+            <a:r>
+              <a:rPr lang="de-AT" dirty="0"/>
+              <a:t> </a:t>
+            </a:r>
+            <a:r>
+              <a:rPr lang="de-AT" dirty="0" err="1"/>
+              <a:t>tree</a:t>
+            </a:r>
+            <a:r>
+              <a:rPr lang="de-AT" dirty="0"/>
+              <a:t> </a:t>
+            </a:r>
+            <a:r>
+              <a:rPr lang="de-AT" dirty="0" err="1"/>
+              <a:t>branch</a:t>
+            </a:r>
+            <a:br>
+              <a:rPr lang="de-AT" dirty="0"/>
+            </a:br>
+            <a:r>
+              <a:rPr lang="de-AT" dirty="0"/>
+              <a:t>The Min Player will </a:t>
+            </a:r>
+            <a:r>
+              <a:rPr lang="de-AT" dirty="0" err="1"/>
+              <a:t>chose</a:t>
+            </a:r>
+            <a:r>
+              <a:rPr lang="de-AT" dirty="0"/>
+              <a:t> </a:t>
+            </a:r>
+            <a:r>
+              <a:rPr lang="de-AT" dirty="0" err="1"/>
+              <a:t>the</a:t>
+            </a:r>
+            <a:r>
+              <a:rPr lang="de-AT" dirty="0"/>
+              <a:t> </a:t>
+            </a:r>
+            <a:r>
+              <a:rPr lang="de-AT" dirty="0" err="1"/>
+              <a:t>branch</a:t>
+            </a:r>
+            <a:r>
+              <a:rPr lang="de-AT" dirty="0"/>
+              <a:t> </a:t>
+            </a:r>
+            <a:r>
+              <a:rPr lang="de-AT" dirty="0" err="1"/>
+              <a:t>with</a:t>
+            </a:r>
+            <a:r>
+              <a:rPr lang="de-AT" dirty="0"/>
+              <a:t> </a:t>
+            </a:r>
+            <a:r>
+              <a:rPr lang="de-AT" dirty="0" err="1"/>
+              <a:t>the</a:t>
+            </a:r>
+            <a:r>
+              <a:rPr lang="de-AT" dirty="0"/>
+              <a:t> </a:t>
+            </a:r>
+            <a:r>
+              <a:rPr lang="de-AT" dirty="0" err="1"/>
+              <a:t>lowest</a:t>
+            </a:r>
+            <a:r>
+              <a:rPr lang="de-AT" dirty="0"/>
+              <a:t> </a:t>
+            </a:r>
+            <a:r>
+              <a:rPr lang="de-AT" dirty="0" err="1"/>
+              <a:t>output</a:t>
+            </a:r>
+            <a:r>
+              <a:rPr lang="de-AT" dirty="0"/>
+              <a:t> </a:t>
+            </a:r>
+            <a:r>
+              <a:rPr lang="de-AT" dirty="0" err="1"/>
+              <a:t>which</a:t>
+            </a:r>
+            <a:r>
+              <a:rPr lang="de-AT" dirty="0"/>
+              <a:t> </a:t>
+            </a:r>
+            <a:r>
+              <a:rPr lang="de-AT" dirty="0" err="1"/>
+              <a:t>is</a:t>
+            </a:r>
+            <a:r>
+              <a:rPr lang="de-AT" dirty="0"/>
+              <a:t> 3 – </a:t>
+            </a:r>
+            <a:r>
+              <a:rPr lang="de-AT" dirty="0" err="1"/>
+              <a:t>this</a:t>
+            </a:r>
+            <a:r>
+              <a:rPr lang="de-AT" dirty="0"/>
+              <a:t> </a:t>
+            </a:r>
+            <a:r>
+              <a:rPr lang="de-AT" dirty="0" err="1"/>
+              <a:t>means</a:t>
+            </a:r>
+            <a:r>
+              <a:rPr lang="de-AT" dirty="0"/>
+              <a:t> </a:t>
+            </a:r>
+            <a:r>
+              <a:rPr lang="de-AT" dirty="0" err="1"/>
+              <a:t>the</a:t>
+            </a:r>
+            <a:r>
+              <a:rPr lang="de-AT" dirty="0"/>
+              <a:t> </a:t>
+            </a:r>
+            <a:r>
+              <a:rPr lang="de-AT" dirty="0" err="1"/>
+              <a:t>beta</a:t>
+            </a:r>
+            <a:r>
+              <a:rPr lang="de-AT" dirty="0"/>
+              <a:t> </a:t>
+            </a:r>
+            <a:r>
+              <a:rPr lang="de-AT" dirty="0" err="1"/>
+              <a:t>value</a:t>
+            </a:r>
+            <a:r>
+              <a:rPr lang="de-AT" dirty="0"/>
+              <a:t> </a:t>
+            </a:r>
+            <a:r>
+              <a:rPr lang="de-AT" dirty="0" err="1"/>
+              <a:t>is</a:t>
+            </a:r>
+            <a:r>
+              <a:rPr lang="de-AT" dirty="0"/>
+              <a:t> </a:t>
+            </a:r>
+            <a:r>
+              <a:rPr lang="de-AT" dirty="0" err="1"/>
+              <a:t>updated</a:t>
+            </a:r>
+            <a:endParaRPr lang="de-AT" dirty="0"/>
+          </a:p>
+          <a:p>
+            <a:pPr marL="0" indent="0">
+              <a:buFontTx/>
+              <a:buNone/>
+            </a:pPr>
+            <a:r>
+              <a:rPr lang="de-AT" dirty="0" err="1"/>
+              <a:t>Than</a:t>
+            </a:r>
+            <a:r>
+              <a:rPr lang="de-AT" dirty="0"/>
+              <a:t> </a:t>
+            </a:r>
+            <a:r>
+              <a:rPr lang="de-AT" dirty="0" err="1"/>
+              <a:t>this</a:t>
+            </a:r>
+            <a:r>
+              <a:rPr lang="de-AT" dirty="0"/>
+              <a:t> </a:t>
+            </a:r>
+            <a:r>
+              <a:rPr lang="de-AT" dirty="0" err="1"/>
+              <a:t>is</a:t>
+            </a:r>
+            <a:r>
+              <a:rPr lang="de-AT" dirty="0"/>
+              <a:t> </a:t>
+            </a:r>
+            <a:r>
+              <a:rPr lang="de-AT" dirty="0" err="1"/>
+              <a:t>propagated</a:t>
+            </a:r>
+            <a:r>
+              <a:rPr lang="de-AT" dirty="0"/>
+              <a:t> </a:t>
+            </a:r>
+            <a:r>
+              <a:rPr lang="de-AT" dirty="0" err="1"/>
+              <a:t>upward</a:t>
+            </a:r>
+            <a:r>
+              <a:rPr lang="de-AT" dirty="0"/>
+              <a:t> and sind 3 &gt;= -</a:t>
+            </a:r>
+            <a:r>
+              <a:rPr lang="de-AT" dirty="0" err="1"/>
+              <a:t>inf</a:t>
+            </a:r>
+            <a:r>
+              <a:rPr lang="de-AT" dirty="0"/>
+              <a:t> </a:t>
+            </a:r>
+            <a:r>
+              <a:rPr lang="de-AT" dirty="0" err="1"/>
+              <a:t>the</a:t>
+            </a:r>
+            <a:r>
+              <a:rPr lang="de-AT" dirty="0"/>
+              <a:t> Max Player </a:t>
+            </a:r>
+            <a:r>
+              <a:rPr lang="de-AT" dirty="0" err="1"/>
+              <a:t>updates</a:t>
+            </a:r>
+            <a:r>
+              <a:rPr lang="de-AT" dirty="0"/>
+              <a:t> </a:t>
+            </a:r>
+            <a:r>
+              <a:rPr lang="de-AT" dirty="0" err="1"/>
+              <a:t>the</a:t>
+            </a:r>
+            <a:r>
+              <a:rPr lang="de-AT" dirty="0"/>
+              <a:t> </a:t>
+            </a:r>
+            <a:r>
+              <a:rPr lang="el-GR" dirty="0"/>
+              <a:t>α</a:t>
+            </a:r>
+            <a:r>
+              <a:rPr lang="de-AT" dirty="0"/>
+              <a:t> </a:t>
+            </a:r>
+            <a:r>
+              <a:rPr lang="de-AT" dirty="0" err="1"/>
+              <a:t>value</a:t>
+            </a:r>
+            <a:br>
+              <a:rPr lang="de-AT" dirty="0"/>
+            </a:br>
+            <a:r>
+              <a:rPr lang="de-AT" dirty="0" err="1"/>
+              <a:t>For</a:t>
+            </a:r>
+            <a:r>
+              <a:rPr lang="de-AT" dirty="0"/>
+              <a:t> </a:t>
+            </a:r>
+            <a:r>
+              <a:rPr lang="de-AT" dirty="0" err="1"/>
+              <a:t>the</a:t>
+            </a:r>
+            <a:r>
+              <a:rPr lang="de-AT" dirty="0"/>
+              <a:t> </a:t>
+            </a:r>
+            <a:r>
+              <a:rPr lang="de-AT" dirty="0" err="1"/>
+              <a:t>second</a:t>
+            </a:r>
+            <a:r>
+              <a:rPr lang="de-AT" dirty="0"/>
+              <a:t> </a:t>
+            </a:r>
+            <a:r>
+              <a:rPr lang="de-AT" dirty="0" err="1"/>
+              <a:t>tree</a:t>
+            </a:r>
+            <a:r>
+              <a:rPr lang="de-AT" dirty="0"/>
+              <a:t> </a:t>
+            </a:r>
+            <a:r>
+              <a:rPr lang="de-AT" dirty="0" err="1"/>
+              <a:t>branch</a:t>
+            </a:r>
+            <a:endParaRPr lang="de-AT" dirty="0"/>
+          </a:p>
+          <a:p>
+            <a:pPr marL="0" indent="0">
+              <a:buFontTx/>
+              <a:buNone/>
+            </a:pPr>
+            <a:r>
+              <a:rPr lang="de-AT" dirty="0"/>
+              <a:t>The </a:t>
+            </a:r>
+            <a:r>
+              <a:rPr lang="de-AT" dirty="0" err="1"/>
+              <a:t>value</a:t>
+            </a:r>
+            <a:r>
+              <a:rPr lang="de-AT" dirty="0"/>
+              <a:t> </a:t>
+            </a:r>
+            <a:r>
+              <a:rPr lang="de-AT" dirty="0" err="1"/>
+              <a:t>of</a:t>
+            </a:r>
+            <a:r>
+              <a:rPr lang="de-AT" dirty="0"/>
+              <a:t> </a:t>
+            </a:r>
+            <a:r>
+              <a:rPr lang="el-GR" dirty="0"/>
+              <a:t>α</a:t>
+            </a:r>
+            <a:r>
+              <a:rPr lang="de-AT" dirty="0"/>
+              <a:t> = 3 </a:t>
+            </a:r>
+            <a:r>
+              <a:rPr lang="de-AT" dirty="0" err="1"/>
+              <a:t>is</a:t>
+            </a:r>
+            <a:r>
+              <a:rPr lang="de-AT" dirty="0"/>
+              <a:t> </a:t>
+            </a:r>
+            <a:r>
+              <a:rPr lang="de-AT" dirty="0" err="1"/>
+              <a:t>now</a:t>
+            </a:r>
+            <a:r>
+              <a:rPr lang="de-AT" dirty="0"/>
+              <a:t> </a:t>
+            </a:r>
+            <a:r>
+              <a:rPr lang="de-AT" dirty="0" err="1"/>
+              <a:t>propagated</a:t>
+            </a:r>
+            <a:r>
+              <a:rPr lang="de-AT" dirty="0"/>
+              <a:t> down </a:t>
+            </a:r>
+            <a:r>
+              <a:rPr lang="de-AT" dirty="0" err="1"/>
+              <a:t>the</a:t>
+            </a:r>
+            <a:r>
+              <a:rPr lang="de-AT" dirty="0"/>
+              <a:t> </a:t>
+            </a:r>
+            <a:r>
+              <a:rPr lang="de-AT" dirty="0" err="1"/>
+              <a:t>tree</a:t>
+            </a:r>
+            <a:r>
+              <a:rPr lang="de-AT" dirty="0"/>
+              <a:t> </a:t>
+            </a:r>
+            <a:r>
+              <a:rPr lang="de-AT" dirty="0" err="1"/>
+              <a:t>to</a:t>
+            </a:r>
+            <a:r>
+              <a:rPr lang="de-AT" dirty="0"/>
+              <a:t> </a:t>
+            </a:r>
+            <a:r>
+              <a:rPr lang="de-AT" dirty="0" err="1"/>
+              <a:t>determin</a:t>
+            </a:r>
+            <a:r>
+              <a:rPr lang="de-AT" dirty="0"/>
+              <a:t> </a:t>
+            </a:r>
+            <a:r>
+              <a:rPr lang="de-AT" dirty="0" err="1"/>
+              <a:t>the</a:t>
+            </a:r>
+            <a:r>
+              <a:rPr lang="de-AT" dirty="0"/>
+              <a:t> </a:t>
+            </a:r>
+            <a:r>
+              <a:rPr lang="de-AT" dirty="0" err="1"/>
+              <a:t>cutoff</a:t>
+            </a:r>
+            <a:r>
+              <a:rPr lang="de-AT" dirty="0"/>
+              <a:t> </a:t>
+            </a:r>
+            <a:r>
+              <a:rPr lang="de-AT" dirty="0" err="1"/>
+              <a:t>condition</a:t>
+            </a:r>
+            <a:br>
+              <a:rPr lang="de-AT" dirty="0"/>
+            </a:br>
+            <a:r>
+              <a:rPr lang="de-AT" dirty="0" err="1"/>
+              <a:t>Now</a:t>
+            </a:r>
+            <a:r>
+              <a:rPr lang="de-AT" dirty="0"/>
+              <a:t> </a:t>
+            </a:r>
+            <a:r>
+              <a:rPr lang="de-AT" dirty="0" err="1"/>
+              <a:t>again</a:t>
+            </a:r>
+            <a:r>
+              <a:rPr lang="de-AT" dirty="0"/>
+              <a:t>, </a:t>
+            </a:r>
+            <a:r>
+              <a:rPr lang="de-AT" dirty="0" err="1"/>
+              <a:t>the</a:t>
+            </a:r>
+            <a:r>
+              <a:rPr lang="de-AT" dirty="0"/>
+              <a:t> Min Player will </a:t>
+            </a:r>
+            <a:r>
+              <a:rPr lang="de-AT" dirty="0" err="1"/>
+              <a:t>choose</a:t>
+            </a:r>
+            <a:r>
+              <a:rPr lang="de-AT" dirty="0"/>
+              <a:t> </a:t>
+            </a:r>
+            <a:r>
+              <a:rPr lang="de-AT" dirty="0" err="1"/>
+              <a:t>the</a:t>
+            </a:r>
+            <a:r>
+              <a:rPr lang="de-AT" dirty="0"/>
+              <a:t> </a:t>
+            </a:r>
+            <a:r>
+              <a:rPr lang="de-AT" dirty="0" err="1"/>
+              <a:t>leftmost</a:t>
+            </a:r>
+            <a:r>
+              <a:rPr lang="de-AT" dirty="0"/>
+              <a:t> </a:t>
+            </a:r>
+            <a:r>
+              <a:rPr lang="de-AT" dirty="0" err="1"/>
+              <a:t>branch</a:t>
+            </a:r>
+            <a:r>
+              <a:rPr lang="de-AT" dirty="0"/>
+              <a:t> 2 – </a:t>
+            </a:r>
+            <a:r>
+              <a:rPr lang="de-AT" dirty="0" err="1"/>
+              <a:t>this</a:t>
+            </a:r>
+            <a:r>
+              <a:rPr lang="de-AT" dirty="0"/>
+              <a:t> </a:t>
+            </a:r>
+            <a:r>
+              <a:rPr lang="de-AT" dirty="0" err="1"/>
+              <a:t>already</a:t>
+            </a:r>
+            <a:r>
+              <a:rPr lang="de-AT" dirty="0"/>
+              <a:t> </a:t>
+            </a:r>
+            <a:r>
+              <a:rPr lang="de-AT" dirty="0" err="1"/>
+              <a:t>fullfills</a:t>
+            </a:r>
+            <a:r>
+              <a:rPr lang="de-AT" dirty="0"/>
+              <a:t> </a:t>
+            </a:r>
+            <a:r>
+              <a:rPr lang="el-GR" dirty="0"/>
+              <a:t>α</a:t>
+            </a:r>
+            <a:r>
+              <a:rPr lang="de-AT" dirty="0"/>
+              <a:t> &gt;= </a:t>
+            </a:r>
+            <a:r>
+              <a:rPr lang="el-GR" dirty="0"/>
+              <a:t>β</a:t>
+            </a:r>
+            <a:r>
+              <a:rPr lang="de-AT" dirty="0"/>
+              <a:t> (3 &gt;= 2) and </a:t>
+            </a:r>
+            <a:r>
+              <a:rPr lang="de-AT" dirty="0" err="1"/>
+              <a:t>we</a:t>
+            </a:r>
+            <a:r>
+              <a:rPr lang="de-AT" dirty="0"/>
+              <a:t> </a:t>
+            </a:r>
+            <a:r>
+              <a:rPr lang="de-AT" dirty="0" err="1"/>
+              <a:t>can</a:t>
+            </a:r>
+            <a:r>
+              <a:rPr lang="de-AT" dirty="0"/>
+              <a:t> </a:t>
+            </a:r>
+            <a:r>
+              <a:rPr lang="de-AT" dirty="0" err="1"/>
+              <a:t>cut</a:t>
+            </a:r>
+            <a:r>
+              <a:rPr lang="de-AT" dirty="0"/>
+              <a:t> </a:t>
+            </a:r>
+            <a:r>
+              <a:rPr lang="de-AT" dirty="0" err="1"/>
+              <a:t>the</a:t>
+            </a:r>
+            <a:r>
+              <a:rPr lang="de-AT" dirty="0"/>
+              <a:t> </a:t>
+            </a:r>
+            <a:r>
+              <a:rPr lang="de-AT" dirty="0" err="1"/>
+              <a:t>remaining</a:t>
+            </a:r>
+            <a:r>
+              <a:rPr lang="de-AT" dirty="0"/>
+              <a:t> </a:t>
+            </a:r>
+            <a:r>
+              <a:rPr lang="de-AT" dirty="0" err="1"/>
+              <a:t>branch</a:t>
+            </a:r>
+            <a:endParaRPr lang="de-AT" dirty="0"/>
+          </a:p>
+          <a:p>
+            <a:pPr marL="0" indent="0">
+              <a:buFontTx/>
+              <a:buNone/>
+            </a:pPr>
+            <a:endParaRPr lang="de-AT" dirty="0"/>
+          </a:p>
+          <a:p>
+            <a:pPr marL="0" indent="0">
+              <a:buFontTx/>
+              <a:buNone/>
+            </a:pPr>
+            <a:r>
+              <a:rPr lang="de-AT" dirty="0"/>
+              <a:t>After </a:t>
+            </a:r>
+            <a:r>
+              <a:rPr lang="de-AT" dirty="0" err="1"/>
+              <a:t>these</a:t>
+            </a:r>
+            <a:r>
+              <a:rPr lang="de-AT" dirty="0"/>
+              <a:t> </a:t>
+            </a:r>
+            <a:r>
+              <a:rPr lang="de-AT" dirty="0" err="1"/>
+              <a:t>steps</a:t>
+            </a:r>
+            <a:r>
+              <a:rPr lang="de-AT" dirty="0"/>
+              <a:t> </a:t>
+            </a:r>
+            <a:r>
+              <a:rPr lang="de-AT" dirty="0" err="1"/>
+              <a:t>the</a:t>
+            </a:r>
+            <a:r>
+              <a:rPr lang="de-AT" dirty="0"/>
+              <a:t> </a:t>
+            </a:r>
+            <a:r>
+              <a:rPr lang="de-AT" dirty="0" err="1"/>
+              <a:t>current</a:t>
+            </a:r>
+            <a:r>
+              <a:rPr lang="de-AT" dirty="0"/>
+              <a:t> Max Player will </a:t>
+            </a:r>
+            <a:r>
+              <a:rPr lang="de-AT" dirty="0" err="1"/>
+              <a:t>choose</a:t>
+            </a:r>
+            <a:r>
+              <a:rPr lang="de-AT" dirty="0"/>
+              <a:t> </a:t>
+            </a:r>
+            <a:r>
+              <a:rPr lang="de-AT" dirty="0" err="1"/>
+              <a:t>the</a:t>
+            </a:r>
+            <a:r>
+              <a:rPr lang="de-AT" dirty="0"/>
+              <a:t> </a:t>
+            </a:r>
+            <a:r>
+              <a:rPr lang="de-AT" dirty="0" err="1"/>
+              <a:t>left</a:t>
+            </a:r>
+            <a:r>
+              <a:rPr lang="de-AT" dirty="0"/>
+              <a:t> </a:t>
+            </a:r>
+            <a:r>
+              <a:rPr lang="de-AT" dirty="0" err="1"/>
+              <a:t>branching</a:t>
+            </a:r>
+            <a:r>
+              <a:rPr lang="de-AT" dirty="0"/>
+              <a:t> </a:t>
+            </a:r>
+            <a:r>
+              <a:rPr lang="de-AT" dirty="0" err="1"/>
+              <a:t>tree</a:t>
+            </a:r>
+            <a:r>
+              <a:rPr lang="de-AT" dirty="0"/>
+              <a:t> and </a:t>
+            </a:r>
+            <a:r>
+              <a:rPr lang="de-AT" dirty="0" err="1"/>
+              <a:t>never</a:t>
+            </a:r>
+            <a:r>
+              <a:rPr lang="de-AT" dirty="0"/>
+              <a:t> </a:t>
+            </a:r>
+            <a:r>
+              <a:rPr lang="de-AT" dirty="0" err="1"/>
+              <a:t>the</a:t>
+            </a:r>
+            <a:r>
+              <a:rPr lang="de-AT" dirty="0"/>
+              <a:t> </a:t>
+            </a:r>
+            <a:r>
+              <a:rPr lang="de-AT" dirty="0" err="1"/>
+              <a:t>right</a:t>
+            </a:r>
             <a:endParaRPr lang="de-AT" dirty="0"/>
           </a:p>
         </p:txBody>
@@ -2645,7 +4090,7 @@
           <a:p>
             <a:fld id="{586C9993-CC30-4DF1-A988-C4E2EFC1E3B3}" type="datetimeFigureOut">
               <a:rPr lang="de-AT" smtClean="0"/>
-              <a:t>14.05.2024</a:t>
+              <a:t>15.05.2024</a:t>
             </a:fld>
             <a:endParaRPr lang="de-AT"/>
           </a:p>
@@ -2845,7 +4290,7 @@
           <a:p>
             <a:fld id="{586C9993-CC30-4DF1-A988-C4E2EFC1E3B3}" type="datetimeFigureOut">
               <a:rPr lang="de-AT" smtClean="0"/>
-              <a:t>14.05.2024</a:t>
+              <a:t>15.05.2024</a:t>
             </a:fld>
             <a:endParaRPr lang="de-AT"/>
           </a:p>
@@ -3055,7 +4500,7 @@
           <a:p>
             <a:fld id="{586C9993-CC30-4DF1-A988-C4E2EFC1E3B3}" type="datetimeFigureOut">
               <a:rPr lang="de-AT" smtClean="0"/>
-              <a:t>14.05.2024</a:t>
+              <a:t>15.05.2024</a:t>
             </a:fld>
             <a:endParaRPr lang="de-AT"/>
           </a:p>
@@ -3255,7 +4700,7 @@
           <a:p>
             <a:fld id="{586C9993-CC30-4DF1-A988-C4E2EFC1E3B3}" type="datetimeFigureOut">
               <a:rPr lang="de-AT" smtClean="0"/>
-              <a:t>14.05.2024</a:t>
+              <a:t>15.05.2024</a:t>
             </a:fld>
             <a:endParaRPr lang="de-AT"/>
           </a:p>
@@ -3531,7 +4976,7 @@
           <a:p>
             <a:fld id="{586C9993-CC30-4DF1-A988-C4E2EFC1E3B3}" type="datetimeFigureOut">
               <a:rPr lang="de-AT" smtClean="0"/>
-              <a:t>14.05.2024</a:t>
+              <a:t>15.05.2024</a:t>
             </a:fld>
             <a:endParaRPr lang="de-AT"/>
           </a:p>
@@ -3799,7 +5244,7 @@
           <a:p>
             <a:fld id="{586C9993-CC30-4DF1-A988-C4E2EFC1E3B3}" type="datetimeFigureOut">
               <a:rPr lang="de-AT" smtClean="0"/>
-              <a:t>14.05.2024</a:t>
+              <a:t>15.05.2024</a:t>
             </a:fld>
             <a:endParaRPr lang="de-AT"/>
           </a:p>
@@ -4214,7 +5659,7 @@
           <a:p>
             <a:fld id="{586C9993-CC30-4DF1-A988-C4E2EFC1E3B3}" type="datetimeFigureOut">
               <a:rPr lang="de-AT" smtClean="0"/>
-              <a:t>14.05.2024</a:t>
+              <a:t>15.05.2024</a:t>
             </a:fld>
             <a:endParaRPr lang="de-AT"/>
           </a:p>
@@ -4356,7 +5801,7 @@
           <a:p>
             <a:fld id="{586C9993-CC30-4DF1-A988-C4E2EFC1E3B3}" type="datetimeFigureOut">
               <a:rPr lang="de-AT" smtClean="0"/>
-              <a:t>14.05.2024</a:t>
+              <a:t>15.05.2024</a:t>
             </a:fld>
             <a:endParaRPr lang="de-AT"/>
           </a:p>
@@ -4469,7 +5914,7 @@
           <a:p>
             <a:fld id="{586C9993-CC30-4DF1-A988-C4E2EFC1E3B3}" type="datetimeFigureOut">
               <a:rPr lang="de-AT" smtClean="0"/>
-              <a:t>14.05.2024</a:t>
+              <a:t>15.05.2024</a:t>
             </a:fld>
             <a:endParaRPr lang="de-AT"/>
           </a:p>
@@ -4782,7 +6227,7 @@
           <a:p>
             <a:fld id="{586C9993-CC30-4DF1-A988-C4E2EFC1E3B3}" type="datetimeFigureOut">
               <a:rPr lang="de-AT" smtClean="0"/>
-              <a:t>14.05.2024</a:t>
+              <a:t>15.05.2024</a:t>
             </a:fld>
             <a:endParaRPr lang="de-AT"/>
           </a:p>
@@ -5071,7 +6516,7 @@
           <a:p>
             <a:fld id="{586C9993-CC30-4DF1-A988-C4E2EFC1E3B3}" type="datetimeFigureOut">
               <a:rPr lang="de-AT" smtClean="0"/>
-              <a:t>14.05.2024</a:t>
+              <a:t>15.05.2024</a:t>
             </a:fld>
             <a:endParaRPr lang="de-AT"/>
           </a:p>
@@ -5314,7 +6759,7 @@
           <a:p>
             <a:fld id="{586C9993-CC30-4DF1-A988-C4E2EFC1E3B3}" type="datetimeFigureOut">
               <a:rPr lang="de-AT" smtClean="0"/>
-              <a:t>14.05.2024</a:t>
+              <a:t>15.05.2024</a:t>
             </a:fld>
             <a:endParaRPr lang="de-AT"/>
           </a:p>
@@ -15493,6 +16938,36 @@
           <a:chExt cx="0" cy="0"/>
         </a:xfrm>
       </p:grpSpPr>
+      <p:pic>
+        <p:nvPicPr>
+          <p:cNvPr id="12" name="Grafik 11">
+            <a:extLst>
+              <a:ext uri="{FF2B5EF4-FFF2-40B4-BE49-F238E27FC236}">
+                <a16:creationId xmlns:a16="http://schemas.microsoft.com/office/drawing/2014/main" id="{97FB0BB6-C4FD-58C0-DF5A-20D4DAE08B4D}"/>
+              </a:ext>
+            </a:extLst>
+          </p:cNvPr>
+          <p:cNvPicPr>
+            <a:picLocks noChangeAspect="1"/>
+          </p:cNvPicPr>
+          <p:nvPr/>
+        </p:nvPicPr>
+        <p:blipFill>
+          <a:blip r:embed="rId3"/>
+          <a:stretch>
+            <a:fillRect/>
+          </a:stretch>
+        </p:blipFill>
+        <p:spPr>
+          <a:xfrm>
+            <a:off x="0" y="326571"/>
+            <a:ext cx="12099638" cy="6531429"/>
+          </a:xfrm>
+          <a:prstGeom prst="rect">
+            <a:avLst/>
+          </a:prstGeom>
+        </p:spPr>
+      </p:pic>
       <p:sp>
         <p:nvSpPr>
           <p:cNvPr id="2" name="Titel 1">
@@ -15511,7 +16986,7 @@
         </p:nvSpPr>
         <p:spPr>
           <a:xfrm>
-            <a:off x="0" y="-304901"/>
+            <a:off x="0" y="-391987"/>
             <a:ext cx="10515600" cy="1325563"/>
           </a:xfrm>
         </p:spPr>
@@ -15537,81 +17012,12 @@
             </a:r>
             <a:r>
               <a:rPr lang="de-AT" dirty="0" err="1"/>
-              <a:t>representation</a:t>
-            </a:r>
-            <a:r>
-              <a:rPr lang="de-AT" dirty="0"/>
-              <a:t> </a:t>
-            </a:r>
-            <a:r>
-              <a:rPr lang="de-AT" dirty="0" err="1"/>
-              <a:t>of</a:t>
-            </a:r>
-            <a:r>
-              <a:rPr lang="de-AT" dirty="0"/>
-              <a:t> Game</a:t>
-            </a:r>
+              <a:t>Representation</a:t>
+            </a:r>
+            <a:endParaRPr lang="de-AT" dirty="0"/>
           </a:p>
         </p:txBody>
       </p:sp>
-      <p:sp>
-        <p:nvSpPr>
-          <p:cNvPr id="3" name="Inhaltsplatzhalter 2">
-            <a:extLst>
-              <a:ext uri="{FF2B5EF4-FFF2-40B4-BE49-F238E27FC236}">
-                <a16:creationId xmlns:a16="http://schemas.microsoft.com/office/drawing/2014/main" id="{79CB9DAA-0D65-FF00-98F5-07560553542F}"/>
-              </a:ext>
-            </a:extLst>
-          </p:cNvPr>
-          <p:cNvSpPr>
-            <a:spLocks noGrp="1"/>
-          </p:cNvSpPr>
-          <p:nvPr>
-            <p:ph idx="1"/>
-          </p:nvPr>
-        </p:nvSpPr>
-        <p:spPr/>
-        <p:txBody>
-          <a:bodyPr/>
-          <a:lstStyle/>
-          <a:p>
-            <a:pPr marL="0" indent="0">
-              <a:buNone/>
-            </a:pPr>
-            <a:endParaRPr lang="de-AT" b="1" dirty="0"/>
-          </a:p>
-        </p:txBody>
-      </p:sp>
-      <p:pic>
-        <p:nvPicPr>
-          <p:cNvPr id="5" name="Grafik 4">
-            <a:extLst>
-              <a:ext uri="{FF2B5EF4-FFF2-40B4-BE49-F238E27FC236}">
-                <a16:creationId xmlns:a16="http://schemas.microsoft.com/office/drawing/2014/main" id="{EF51265C-B9AB-4EAD-CC68-A384C1CE93E8}"/>
-              </a:ext>
-            </a:extLst>
-          </p:cNvPr>
-          <p:cNvPicPr>
-            <a:picLocks noChangeAspect="1"/>
-          </p:cNvPicPr>
-          <p:nvPr/>
-        </p:nvPicPr>
-        <p:blipFill>
-          <a:blip r:embed="rId3"/>
-          <a:stretch>
-            <a:fillRect/>
-          </a:stretch>
-        </p:blipFill>
-        <p:spPr>
-          <a:xfrm>
-            <a:off x="317500" y="618638"/>
-            <a:ext cx="11557000" cy="6239362"/>
-          </a:xfrm>
-          <a:prstGeom prst="rect">
-            <a:avLst/>
-          </a:prstGeom>
-        </p:spPr>
-      </p:pic>
     </p:spTree>
     <p:extLst>
       <p:ext uri="{BB962C8B-B14F-4D97-AF65-F5344CB8AC3E}">

</xml_diff>

<commit_message>
Adapted graph of tree based game
</commit_message>
<xml_diff>
--- a/doc/ConnectFourPresentationDraft.pptx
+++ b/doc/ConnectFourPresentationDraft.pptx
@@ -274,7 +274,7 @@
           <a:p>
             <a:fld id="{CCFEB230-CD1F-447C-B1A3-C00E1A95CFE7}" type="datetimeFigureOut">
               <a:rPr lang="de-AT" smtClean="0"/>
-              <a:t>15.05.2024</a:t>
+              <a:t>16.05.2024</a:t>
             </a:fld>
             <a:endParaRPr lang="de-AT"/>
           </a:p>
@@ -4090,7 +4090,7 @@
           <a:p>
             <a:fld id="{586C9993-CC30-4DF1-A988-C4E2EFC1E3B3}" type="datetimeFigureOut">
               <a:rPr lang="de-AT" smtClean="0"/>
-              <a:t>15.05.2024</a:t>
+              <a:t>16.05.2024</a:t>
             </a:fld>
             <a:endParaRPr lang="de-AT"/>
           </a:p>
@@ -4290,7 +4290,7 @@
           <a:p>
             <a:fld id="{586C9993-CC30-4DF1-A988-C4E2EFC1E3B3}" type="datetimeFigureOut">
               <a:rPr lang="de-AT" smtClean="0"/>
-              <a:t>15.05.2024</a:t>
+              <a:t>16.05.2024</a:t>
             </a:fld>
             <a:endParaRPr lang="de-AT"/>
           </a:p>
@@ -4500,7 +4500,7 @@
           <a:p>
             <a:fld id="{586C9993-CC30-4DF1-A988-C4E2EFC1E3B3}" type="datetimeFigureOut">
               <a:rPr lang="de-AT" smtClean="0"/>
-              <a:t>15.05.2024</a:t>
+              <a:t>16.05.2024</a:t>
             </a:fld>
             <a:endParaRPr lang="de-AT"/>
           </a:p>
@@ -4700,7 +4700,7 @@
           <a:p>
             <a:fld id="{586C9993-CC30-4DF1-A988-C4E2EFC1E3B3}" type="datetimeFigureOut">
               <a:rPr lang="de-AT" smtClean="0"/>
-              <a:t>15.05.2024</a:t>
+              <a:t>16.05.2024</a:t>
             </a:fld>
             <a:endParaRPr lang="de-AT"/>
           </a:p>
@@ -4976,7 +4976,7 @@
           <a:p>
             <a:fld id="{586C9993-CC30-4DF1-A988-C4E2EFC1E3B3}" type="datetimeFigureOut">
               <a:rPr lang="de-AT" smtClean="0"/>
-              <a:t>15.05.2024</a:t>
+              <a:t>16.05.2024</a:t>
             </a:fld>
             <a:endParaRPr lang="de-AT"/>
           </a:p>
@@ -5244,7 +5244,7 @@
           <a:p>
             <a:fld id="{586C9993-CC30-4DF1-A988-C4E2EFC1E3B3}" type="datetimeFigureOut">
               <a:rPr lang="de-AT" smtClean="0"/>
-              <a:t>15.05.2024</a:t>
+              <a:t>16.05.2024</a:t>
             </a:fld>
             <a:endParaRPr lang="de-AT"/>
           </a:p>
@@ -5659,7 +5659,7 @@
           <a:p>
             <a:fld id="{586C9993-CC30-4DF1-A988-C4E2EFC1E3B3}" type="datetimeFigureOut">
               <a:rPr lang="de-AT" smtClean="0"/>
-              <a:t>15.05.2024</a:t>
+              <a:t>16.05.2024</a:t>
             </a:fld>
             <a:endParaRPr lang="de-AT"/>
           </a:p>
@@ -5801,7 +5801,7 @@
           <a:p>
             <a:fld id="{586C9993-CC30-4DF1-A988-C4E2EFC1E3B3}" type="datetimeFigureOut">
               <a:rPr lang="de-AT" smtClean="0"/>
-              <a:t>15.05.2024</a:t>
+              <a:t>16.05.2024</a:t>
             </a:fld>
             <a:endParaRPr lang="de-AT"/>
           </a:p>
@@ -5914,7 +5914,7 @@
           <a:p>
             <a:fld id="{586C9993-CC30-4DF1-A988-C4E2EFC1E3B3}" type="datetimeFigureOut">
               <a:rPr lang="de-AT" smtClean="0"/>
-              <a:t>15.05.2024</a:t>
+              <a:t>16.05.2024</a:t>
             </a:fld>
             <a:endParaRPr lang="de-AT"/>
           </a:p>
@@ -6227,7 +6227,7 @@
           <a:p>
             <a:fld id="{586C9993-CC30-4DF1-A988-C4E2EFC1E3B3}" type="datetimeFigureOut">
               <a:rPr lang="de-AT" smtClean="0"/>
-              <a:t>15.05.2024</a:t>
+              <a:t>16.05.2024</a:t>
             </a:fld>
             <a:endParaRPr lang="de-AT"/>
           </a:p>
@@ -6516,7 +6516,7 @@
           <a:p>
             <a:fld id="{586C9993-CC30-4DF1-A988-C4E2EFC1E3B3}" type="datetimeFigureOut">
               <a:rPr lang="de-AT" smtClean="0"/>
-              <a:t>15.05.2024</a:t>
+              <a:t>16.05.2024</a:t>
             </a:fld>
             <a:endParaRPr lang="de-AT"/>
           </a:p>
@@ -6759,7 +6759,7 @@
           <a:p>
             <a:fld id="{586C9993-CC30-4DF1-A988-C4E2EFC1E3B3}" type="datetimeFigureOut">
               <a:rPr lang="de-AT" smtClean="0"/>
-              <a:t>15.05.2024</a:t>
+              <a:t>16.05.2024</a:t>
             </a:fld>
             <a:endParaRPr lang="de-AT"/>
           </a:p>
@@ -16940,10 +16940,10 @@
       </p:grpSpPr>
       <p:pic>
         <p:nvPicPr>
-          <p:cNvPr id="12" name="Grafik 11">
+          <p:cNvPr id="4" name="Grafik 3">
             <a:extLst>
               <a:ext uri="{FF2B5EF4-FFF2-40B4-BE49-F238E27FC236}">
-                <a16:creationId xmlns:a16="http://schemas.microsoft.com/office/drawing/2014/main" id="{97FB0BB6-C4FD-58C0-DF5A-20D4DAE08B4D}"/>
+                <a16:creationId xmlns:a16="http://schemas.microsoft.com/office/drawing/2014/main" id="{8BC84426-4D09-0288-FB21-09F92E1F0C84}"/>
               </a:ext>
             </a:extLst>
           </p:cNvPr>
@@ -16960,8 +16960,8 @@
         </p:blipFill>
         <p:spPr>
           <a:xfrm>
-            <a:off x="0" y="326571"/>
-            <a:ext cx="12099638" cy="6531429"/>
+            <a:off x="65460" y="473529"/>
+            <a:ext cx="12126540" cy="6384471"/>
           </a:xfrm>
           <a:prstGeom prst="rect">
             <a:avLst/>

</xml_diff>

<commit_message>
Forgot beta update on second branch
</commit_message>
<xml_diff>
--- a/doc/ConnectFourPresentationDraft.pptx
+++ b/doc/ConnectFourPresentationDraft.pptx
@@ -16940,10 +16940,10 @@
       </p:grpSpPr>
       <p:pic>
         <p:nvPicPr>
-          <p:cNvPr id="4" name="Grafik 3">
+          <p:cNvPr id="5" name="Grafik 4">
             <a:extLst>
               <a:ext uri="{FF2B5EF4-FFF2-40B4-BE49-F238E27FC236}">
-                <a16:creationId xmlns:a16="http://schemas.microsoft.com/office/drawing/2014/main" id="{8BC84426-4D09-0288-FB21-09F92E1F0C84}"/>
+                <a16:creationId xmlns:a16="http://schemas.microsoft.com/office/drawing/2014/main" id="{51035A68-2CE0-769D-49A7-43155083C332}"/>
               </a:ext>
             </a:extLst>
           </p:cNvPr>
@@ -16960,8 +16960,8 @@
         </p:blipFill>
         <p:spPr>
           <a:xfrm>
-            <a:off x="65460" y="473529"/>
-            <a:ext cx="12126540" cy="6384471"/>
+            <a:off x="0" y="344273"/>
+            <a:ext cx="12029746" cy="6368143"/>
           </a:xfrm>
           <a:prstGeom prst="rect">
             <a:avLst/>
@@ -16997,14 +16997,6 @@
             <a:r>
               <a:rPr lang="de-AT" dirty="0" err="1"/>
               <a:t>Tree</a:t>
-            </a:r>
-            <a:r>
-              <a:rPr lang="de-AT" dirty="0"/>
-              <a:t> </a:t>
-            </a:r>
-            <a:r>
-              <a:rPr lang="de-AT" dirty="0" err="1"/>
-              <a:t>Based</a:t>
             </a:r>
             <a:r>
               <a:rPr lang="de-AT" dirty="0"/>

</xml_diff>

<commit_message>
added task name to comparison table
</commit_message>
<xml_diff>
--- a/doc/ConnectFourPresentationDraft.pptx
+++ b/doc/ConnectFourPresentationDraft.pptx
@@ -12861,7 +12861,12 @@
             <p:ph idx="1"/>
           </p:nvPr>
         </p:nvSpPr>
-        <p:spPr/>
+        <p:spPr>
+          <a:xfrm>
+            <a:off x="838200" y="1825625"/>
+            <a:ext cx="10845800" cy="4351338"/>
+          </a:xfrm>
+        </p:spPr>
         <p:txBody>
           <a:bodyPr/>
           <a:lstStyle/>
@@ -12952,70 +12957,70 @@
           <p:nvPr>
             <p:extLst>
               <p:ext uri="{D42A27DB-BD31-4B8C-83A1-F6EECF244321}">
-                <p14:modId xmlns:p14="http://schemas.microsoft.com/office/powerpoint/2010/main" val="1781029833"/>
+                <p14:modId xmlns:p14="http://schemas.microsoft.com/office/powerpoint/2010/main" val="3102232869"/>
               </p:ext>
             </p:extLst>
           </p:nvPr>
         </p:nvGraphicFramePr>
         <p:xfrm>
-          <a:off x="1076960" y="2418080"/>
-          <a:ext cx="9834880" cy="3558963"/>
+          <a:off x="431800" y="2418080"/>
+          <a:ext cx="11252200" cy="4057525"/>
         </p:xfrm>
         <a:graphic>
           <a:graphicData uri="http://schemas.openxmlformats.org/drawingml/2006/table">
             <a:tbl>
               <a:tblPr/>
               <a:tblGrid>
-                <a:gridCol w="1282700">
+                <a:gridCol w="1467551">
                   <a:extLst>
                     <a:ext uri="{9D8B030D-6E8A-4147-A177-3AD203B41FA5}">
                       <a16:colId xmlns:a16="http://schemas.microsoft.com/office/drawing/2014/main" val="2654556058"/>
                     </a:ext>
                   </a:extLst>
                 </a:gridCol>
-                <a:gridCol w="1221740">
+                <a:gridCol w="1397807">
                   <a:extLst>
                     <a:ext uri="{9D8B030D-6E8A-4147-A177-3AD203B41FA5}">
                       <a16:colId xmlns:a16="http://schemas.microsoft.com/office/drawing/2014/main" val="1262114508"/>
                     </a:ext>
                   </a:extLst>
                 </a:gridCol>
-                <a:gridCol w="1221740">
+                <a:gridCol w="1397807">
                   <a:extLst>
                     <a:ext uri="{9D8B030D-6E8A-4147-A177-3AD203B41FA5}">
                       <a16:colId xmlns:a16="http://schemas.microsoft.com/office/drawing/2014/main" val="1885339903"/>
                     </a:ext>
                   </a:extLst>
                 </a:gridCol>
-                <a:gridCol w="1221740">
+                <a:gridCol w="1397807">
                   <a:extLst>
                     <a:ext uri="{9D8B030D-6E8A-4147-A177-3AD203B41FA5}">
                       <a16:colId xmlns:a16="http://schemas.microsoft.com/office/drawing/2014/main" val="1209784926"/>
                     </a:ext>
                   </a:extLst>
                 </a:gridCol>
-                <a:gridCol w="1221740">
+                <a:gridCol w="1397807">
                   <a:extLst>
                     <a:ext uri="{9D8B030D-6E8A-4147-A177-3AD203B41FA5}">
                       <a16:colId xmlns:a16="http://schemas.microsoft.com/office/drawing/2014/main" val="978662276"/>
                     </a:ext>
                   </a:extLst>
                 </a:gridCol>
-                <a:gridCol w="1221740">
+                <a:gridCol w="1397807">
                   <a:extLst>
                     <a:ext uri="{9D8B030D-6E8A-4147-A177-3AD203B41FA5}">
                       <a16:colId xmlns:a16="http://schemas.microsoft.com/office/drawing/2014/main" val="1482760682"/>
                     </a:ext>
                   </a:extLst>
                 </a:gridCol>
-                <a:gridCol w="1221740">
+                <a:gridCol w="1397807">
                   <a:extLst>
                     <a:ext uri="{9D8B030D-6E8A-4147-A177-3AD203B41FA5}">
                       <a16:colId xmlns:a16="http://schemas.microsoft.com/office/drawing/2014/main" val="1759925785"/>
                     </a:ext>
                   </a:extLst>
                 </a:gridCol>
-                <a:gridCol w="1221740">
+                <a:gridCol w="1397807">
                   <a:extLst>
                     <a:ext uri="{9D8B030D-6E8A-4147-A177-3AD203B41FA5}">
                       <a16:colId xmlns:a16="http://schemas.microsoft.com/office/drawing/2014/main" val="645632569"/>
@@ -13023,7 +13028,7 @@
                   </a:extLst>
                 </a:gridCol>
               </a:tblGrid>
-              <a:tr h="479213">
+              <a:tr h="665606">
                 <a:tc>
                   <a:txBody>
                     <a:bodyPr/>
@@ -13091,18 +13096,31 @@
                     <a:p>
                       <a:pPr algn="ctr" fontAlgn="b"/>
                       <a:r>
-                        <a:rPr lang="de-AT" sz="2000" b="0" i="0" u="none" strike="noStrike" dirty="0">
+                        <a:rPr lang="de-AT" sz="1800" b="0" i="0" u="none" strike="noStrike" dirty="0">
                           <a:solidFill>
                             <a:srgbClr val="000000"/>
                           </a:solidFill>
                           <a:effectLst/>
                           <a:latin typeface="Calibri" panose="020F0502020204030204" pitchFamily="34" charset="0"/>
                         </a:rPr>
-                        <a:t>1</a:t>
+                        <a:t>1 </a:t>
+                      </a:r>
+                    </a:p>
+                    <a:p>
+                      <a:pPr algn="ctr" fontAlgn="b"/>
+                      <a:r>
+                        <a:rPr lang="de-AT" sz="1800" b="0" i="0" u="none" strike="noStrike" dirty="0">
+                          <a:solidFill>
+                            <a:srgbClr val="000000"/>
+                          </a:solidFill>
+                          <a:effectLst/>
+                          <a:latin typeface="Calibri" panose="020F0502020204030204" pitchFamily="34" charset="0"/>
+                        </a:rPr>
+                        <a:t>Base</a:t>
                       </a:r>
                     </a:p>
                   </a:txBody>
-                  <a:tcPr marL="6350" marR="6350" marT="6350" marB="0" anchor="b">
+                  <a:tcPr marL="6350" marR="6350" marT="6350" marB="0">
                     <a:lnL w="6350" cap="flat" cmpd="sng" algn="ctr">
                       <a:solidFill>
                         <a:srgbClr val="000000"/>
@@ -13151,18 +13169,48 @@
                     <a:p>
                       <a:pPr algn="ctr" fontAlgn="b"/>
                       <a:r>
-                        <a:rPr lang="de-AT" sz="2000" b="0" i="0" u="none" strike="noStrike" dirty="0">
+                        <a:rPr lang="de-AT" sz="1800" b="0" i="0" u="none" strike="noStrike" dirty="0">
                           <a:solidFill>
                             <a:srgbClr val="000000"/>
                           </a:solidFill>
                           <a:effectLst/>
                           <a:latin typeface="Calibri" panose="020F0502020204030204" pitchFamily="34" charset="0"/>
                         </a:rPr>
-                        <a:t>2</a:t>
+                        <a:t>2 </a:t>
                       </a:r>
                     </a:p>
+                    <a:p>
+                      <a:pPr algn="ctr" fontAlgn="b"/>
+                      <a:r>
+                        <a:rPr lang="de-AT" sz="1800" b="0" i="0" u="none" strike="noStrike" dirty="0">
+                          <a:solidFill>
+                            <a:srgbClr val="000000"/>
+                          </a:solidFill>
+                          <a:effectLst/>
+                          <a:latin typeface="Calibri" panose="020F0502020204030204" pitchFamily="34" charset="0"/>
+                        </a:rPr>
+                        <a:t>Pure </a:t>
+                      </a:r>
+                      <a:r>
+                        <a:rPr lang="de-AT" sz="1800" b="0" i="0" u="none" strike="noStrike" dirty="0" err="1">
+                          <a:solidFill>
+                            <a:srgbClr val="000000"/>
+                          </a:solidFill>
+                          <a:effectLst/>
+                          <a:latin typeface="Calibri" panose="020F0502020204030204" pitchFamily="34" charset="0"/>
+                        </a:rPr>
+                        <a:t>MinMax</a:t>
+                      </a:r>
+                      <a:endParaRPr lang="de-AT" sz="1800" b="0" i="0" u="none" strike="noStrike" dirty="0">
+                        <a:solidFill>
+                          <a:srgbClr val="000000"/>
+                        </a:solidFill>
+                        <a:effectLst/>
+                        <a:latin typeface="Calibri" panose="020F0502020204030204" pitchFamily="34" charset="0"/>
+                      </a:endParaRPr>
+                    </a:p>
                   </a:txBody>
-                  <a:tcPr marL="6350" marR="6350" marT="6350" marB="0" anchor="b">
+                  <a:tcPr marL="6350" marR="6350" marT="6350" marB="0">
                     <a:lnL w="6350" cap="flat" cmpd="sng" algn="ctr">
                       <a:solidFill>
                         <a:srgbClr val="000000"/>
@@ -13211,18 +13259,38 @@
                     <a:p>
                       <a:pPr algn="ctr" fontAlgn="b"/>
                       <a:r>
-                        <a:rPr lang="de-AT" sz="2000" b="0" i="0" u="none" strike="noStrike" dirty="0">
+                        <a:rPr lang="de-AT" sz="1800" b="0" i="0" u="none" strike="noStrike" dirty="0">
                           <a:solidFill>
                             <a:srgbClr val="000000"/>
                           </a:solidFill>
                           <a:effectLst/>
                           <a:latin typeface="Calibri" panose="020F0502020204030204" pitchFamily="34" charset="0"/>
                         </a:rPr>
-                        <a:t>3</a:t>
+                        <a:t>3 </a:t>
                       </a:r>
                     </a:p>
+                    <a:p>
+                      <a:pPr algn="ctr" fontAlgn="b"/>
+                      <a:r>
+                        <a:rPr lang="de-AT" sz="1800" b="0" i="0" u="none" strike="noStrike" dirty="0" err="1">
+                          <a:solidFill>
+                            <a:srgbClr val="000000"/>
+                          </a:solidFill>
+                          <a:effectLst/>
+                          <a:latin typeface="Calibri" panose="020F0502020204030204" pitchFamily="34" charset="0"/>
+                        </a:rPr>
+                        <a:t>SimplePruning</a:t>
+                      </a:r>
+                      <a:endParaRPr lang="de-AT" sz="1800" b="0" i="0" u="none" strike="noStrike" dirty="0">
+                        <a:solidFill>
+                          <a:srgbClr val="000000"/>
+                        </a:solidFill>
+                        <a:effectLst/>
+                        <a:latin typeface="Calibri" panose="020F0502020204030204" pitchFamily="34" charset="0"/>
+                      </a:endParaRPr>
+                    </a:p>
                   </a:txBody>
-                  <a:tcPr marL="6350" marR="6350" marT="6350" marB="0" anchor="b">
+                  <a:tcPr marL="6350" marR="6350" marT="6350" marB="0">
                     <a:lnL w="6350" cap="flat" cmpd="sng" algn="ctr">
                       <a:solidFill>
                         <a:srgbClr val="000000"/>
@@ -13271,18 +13339,58 @@
                     <a:p>
                       <a:pPr algn="ctr" fontAlgn="b"/>
                       <a:r>
-                        <a:rPr lang="de-AT" sz="2000" b="0" i="0" u="none" strike="noStrike" dirty="0">
+                        <a:rPr lang="de-AT" sz="1800" b="0" i="0" u="none" strike="noStrike" dirty="0">
                           <a:solidFill>
                             <a:srgbClr val="000000"/>
                           </a:solidFill>
                           <a:effectLst/>
                           <a:latin typeface="Calibri" panose="020F0502020204030204" pitchFamily="34" charset="0"/>
                         </a:rPr>
-                        <a:t>4</a:t>
+                        <a:t>4 </a:t>
                       </a:r>
                     </a:p>
+                    <a:p>
+                      <a:pPr algn="ctr" fontAlgn="b"/>
+                      <a:r>
+                        <a:rPr lang="de-AT" sz="1800" b="0" i="0" u="none" strike="noStrike" dirty="0">
+                          <a:solidFill>
+                            <a:srgbClr val="000000"/>
+                          </a:solidFill>
+                          <a:effectLst/>
+                          <a:latin typeface="Calibri" panose="020F0502020204030204" pitchFamily="34" charset="0"/>
+                        </a:rPr>
+                        <a:t>Deep [</a:t>
+                      </a:r>
+                      <a:r>
+                        <a:rPr lang="el-GR" sz="1800" dirty="0"/>
+                        <a:t>α</a:t>
+                      </a:r>
+                      <a:r>
+                        <a:rPr lang="de-AT" sz="1800" dirty="0"/>
+                        <a:t>,</a:t>
+                      </a:r>
+                      <a:r>
+                        <a:rPr lang="el-GR" sz="1800" dirty="0"/>
+                        <a:t>β</a:t>
+                      </a:r>
+                      <a:r>
+                        <a:rPr lang="de-AT" sz="1800" dirty="0"/>
+                        <a:t>]</a:t>
+                      </a:r>
+                      <a:r>
+                        <a:rPr lang="de-AT" sz="1800" dirty="0" err="1"/>
+                        <a:t>Pruning</a:t>
+                      </a:r>
+                      <a:endParaRPr lang="de-AT" sz="1800" b="0" i="0" u="none" strike="noStrike" dirty="0">
+                        <a:solidFill>
+                          <a:srgbClr val="000000"/>
+                        </a:solidFill>
+                        <a:effectLst/>
+                        <a:latin typeface="Calibri" panose="020F0502020204030204" pitchFamily="34" charset="0"/>
+                      </a:endParaRPr>
+                    </a:p>
                   </a:txBody>
-                  <a:tcPr marL="6350" marR="6350" marT="6350" marB="0" anchor="b">
+                  <a:tcPr marL="6350" marR="6350" marT="6350" marB="0">
                     <a:lnL w="6350" cap="flat" cmpd="sng" algn="ctr">
                       <a:solidFill>
                         <a:srgbClr val="000000"/>
@@ -13331,7 +13439,7 @@
                     <a:p>
                       <a:pPr algn="ctr" fontAlgn="b"/>
                       <a:r>
-                        <a:rPr lang="de-AT" sz="2000" b="0" i="0" u="none" strike="noStrike" dirty="0">
+                        <a:rPr lang="de-AT" sz="1800" b="0" i="0" u="none" strike="noStrike" dirty="0">
                           <a:solidFill>
                             <a:srgbClr val="000000"/>
                           </a:solidFill>
@@ -13341,8 +13449,58 @@
                         <a:t>5a</a:t>
                       </a:r>
                     </a:p>
+                    <a:p>
+                      <a:pPr algn="ctr" fontAlgn="b"/>
+                      <a:r>
+                        <a:rPr lang="de-AT" sz="1800" b="0" i="0" u="none" strike="noStrike" dirty="0">
+                          <a:solidFill>
+                            <a:srgbClr val="000000"/>
+                          </a:solidFill>
+                          <a:effectLst/>
+                          <a:latin typeface="Calibri" panose="020F0502020204030204" pitchFamily="34" charset="0"/>
+                        </a:rPr>
+                        <a:t> </a:t>
+                      </a:r>
+                      <a:r>
+                        <a:rPr lang="de-AT" sz="1800" b="0" i="0" u="none" strike="noStrike" dirty="0" err="1">
+                          <a:solidFill>
+                            <a:srgbClr val="000000"/>
+                          </a:solidFill>
+                          <a:effectLst/>
+                          <a:latin typeface="Calibri" panose="020F0502020204030204" pitchFamily="34" charset="0"/>
+                        </a:rPr>
+                        <a:t>Heuristic</a:t>
+                      </a:r>
+                      <a:r>
+                        <a:rPr lang="de-AT" sz="1800" b="0" i="0" u="none" strike="noStrike" dirty="0">
+                          <a:solidFill>
+                            <a:srgbClr val="000000"/>
+                          </a:solidFill>
+                          <a:effectLst/>
+                          <a:latin typeface="Calibri" panose="020F0502020204030204" pitchFamily="34" charset="0"/>
+                        </a:rPr>
+                        <a:t> </a:t>
+                      </a:r>
+                      <a:r>
+                        <a:rPr lang="de-AT" sz="1800" b="0" i="0" u="none" strike="noStrike" dirty="0" err="1">
+                          <a:solidFill>
+                            <a:srgbClr val="000000"/>
+                          </a:solidFill>
+                          <a:effectLst/>
+                          <a:latin typeface="Calibri" panose="020F0502020204030204" pitchFamily="34" charset="0"/>
+                        </a:rPr>
+                        <a:t>MinMax</a:t>
+                      </a:r>
+                      <a:endParaRPr lang="de-AT" sz="1800" b="0" i="0" u="none" strike="noStrike" dirty="0">
+                        <a:solidFill>
+                          <a:srgbClr val="000000"/>
+                        </a:solidFill>
+                        <a:effectLst/>
+                        <a:latin typeface="Calibri" panose="020F0502020204030204" pitchFamily="34" charset="0"/>
+                      </a:endParaRPr>
+                    </a:p>
                   </a:txBody>
-                  <a:tcPr marL="6350" marR="6350" marT="6350" marB="0" anchor="b">
+                  <a:tcPr marL="6350" marR="6350" marT="6350" marB="0">
                     <a:lnL w="6350" cap="flat" cmpd="sng" algn="ctr">
                       <a:solidFill>
                         <a:srgbClr val="000000"/>
@@ -13391,7 +13549,7 @@
                     <a:p>
                       <a:pPr algn="ctr" fontAlgn="b"/>
                       <a:r>
-                        <a:rPr lang="de-AT" sz="2000" b="0" i="0" u="none" strike="noStrike" dirty="0">
+                        <a:rPr lang="de-AT" sz="1800" b="0" i="0" u="none" strike="noStrike" dirty="0">
                           <a:solidFill>
                             <a:srgbClr val="000000"/>
                           </a:solidFill>
@@ -13401,8 +13559,58 @@
                         <a:t>5b</a:t>
                       </a:r>
                     </a:p>
+                    <a:p>
+                      <a:pPr algn="ctr" fontAlgn="b"/>
+                      <a:r>
+                        <a:rPr lang="de-AT" sz="1800" b="0" i="0" u="none" strike="noStrike" dirty="0">
+                          <a:solidFill>
+                            <a:srgbClr val="000000"/>
+                          </a:solidFill>
+                          <a:effectLst/>
+                          <a:latin typeface="Calibri" panose="020F0502020204030204" pitchFamily="34" charset="0"/>
+                        </a:rPr>
+                        <a:t> </a:t>
+                      </a:r>
+                      <a:r>
+                        <a:rPr lang="de-AT" sz="1800" b="0" i="0" u="none" strike="noStrike" dirty="0" err="1">
+                          <a:solidFill>
+                            <a:srgbClr val="000000"/>
+                          </a:solidFill>
+                          <a:effectLst/>
+                          <a:latin typeface="Calibri" panose="020F0502020204030204" pitchFamily="34" charset="0"/>
+                        </a:rPr>
+                        <a:t>Heuristic</a:t>
+                      </a:r>
+                      <a:r>
+                        <a:rPr lang="de-AT" sz="1800" b="0" i="0" u="none" strike="noStrike" dirty="0">
+                          <a:solidFill>
+                            <a:srgbClr val="000000"/>
+                          </a:solidFill>
+                          <a:effectLst/>
+                          <a:latin typeface="Calibri" panose="020F0502020204030204" pitchFamily="34" charset="0"/>
+                        </a:rPr>
+                        <a:t> Deep </a:t>
+                      </a:r>
+                      <a:r>
+                        <a:rPr lang="de-AT" sz="1800" b="0" i="0" u="none" strike="noStrike" dirty="0" err="1">
+                          <a:solidFill>
+                            <a:srgbClr val="000000"/>
+                          </a:solidFill>
+                          <a:effectLst/>
+                          <a:latin typeface="Calibri" panose="020F0502020204030204" pitchFamily="34" charset="0"/>
+                        </a:rPr>
+                        <a:t>Pruning</a:t>
+                      </a:r>
+                      <a:endParaRPr lang="de-AT" sz="1800" b="0" i="0" u="none" strike="noStrike" dirty="0">
+                        <a:solidFill>
+                          <a:srgbClr val="000000"/>
+                        </a:solidFill>
+                        <a:effectLst/>
+                        <a:latin typeface="Calibri" panose="020F0502020204030204" pitchFamily="34" charset="0"/>
+                      </a:endParaRPr>
+                    </a:p>
                   </a:txBody>
-                  <a:tcPr marL="6350" marR="6350" marT="6350" marB="0" anchor="b">
+                  <a:tcPr marL="6350" marR="6350" marT="6350" marB="0">
                     <a:lnL w="6350" cap="flat" cmpd="sng" algn="ctr">
                       <a:solidFill>
                         <a:srgbClr val="000000"/>
@@ -13451,7 +13659,7 @@
                     <a:p>
                       <a:pPr algn="ctr" fontAlgn="b"/>
                       <a:r>
-                        <a:rPr lang="de-AT" sz="2000" b="0" i="0" u="none" strike="noStrike" dirty="0" err="1">
+                        <a:rPr lang="de-AT" sz="1800" b="0" i="0" u="none" strike="noStrike" dirty="0" err="1">
                           <a:solidFill>
                             <a:srgbClr val="000000"/>
                           </a:solidFill>
@@ -13460,7 +13668,7 @@
                         </a:rPr>
                         <a:t>Combined</a:t>
                       </a:r>
-                      <a:endParaRPr lang="de-AT" sz="2000" b="0" i="0" u="none" strike="noStrike" dirty="0">
+                      <a:endParaRPr lang="de-AT" sz="1800" b="0" i="0" u="none" strike="noStrike" dirty="0">
                         <a:solidFill>
                           <a:srgbClr val="000000"/>
                         </a:solidFill>
@@ -13469,7 +13677,7 @@
                       </a:endParaRPr>
                     </a:p>
                   </a:txBody>
-                  <a:tcPr marL="6350" marR="6350" marT="6350" marB="0" anchor="b">
+                  <a:tcPr marL="6350" marR="6350" marT="6350" marB="0">
                     <a:lnL w="6350" cap="flat" cmpd="sng" algn="ctr">
                       <a:solidFill>
                         <a:srgbClr val="000000"/>
@@ -13517,7 +13725,7 @@
                   </a:ext>
                 </a:extLst>
               </a:tr>
-              <a:tr h="479213">
+              <a:tr h="645643">
                 <a:tc>
                   <a:txBody>
                     <a:bodyPr/>
@@ -13990,7 +14198,7 @@
                   </a:ext>
                 </a:extLst>
               </a:tr>
-              <a:tr h="479213">
+              <a:tr h="645643">
                 <a:tc>
                   <a:txBody>
                     <a:bodyPr/>
@@ -14463,7 +14671,7 @@
                   </a:ext>
                 </a:extLst>
               </a:tr>
-              <a:tr h="479213">
+              <a:tr h="645643">
                 <a:tc>
                   <a:txBody>
                     <a:bodyPr/>
@@ -14936,7 +15144,7 @@
                   </a:ext>
                 </a:extLst>
               </a:tr>
-              <a:tr h="479213">
+              <a:tr h="645643">
                 <a:tc>
                   <a:txBody>
                     <a:bodyPr/>
@@ -15409,7 +15617,7 @@
                   </a:ext>
                 </a:extLst>
               </a:tr>
-              <a:tr h="479213">
+              <a:tr h="645643">
                 <a:tc>
                   <a:txBody>
                     <a:bodyPr/>

</xml_diff>